<commit_message>
partie 47 : syllabus et exos "GUI", y compris MVC
</commit_message>
<xml_diff>
--- a/syllabus/11-POO-basic/11_syllabus.pptx
+++ b/syllabus/11-POO-basic/11_syllabus.pptx
@@ -2,7 +2,7 @@
 <file path=ppt/presentation.xml><?xml version="1.0" encoding="utf-8"?>
 <p:presentation xmlns:a="http://schemas.openxmlformats.org/drawingml/2006/main" xmlns:r="http://schemas.openxmlformats.org/officeDocument/2006/relationships" xmlns:p="http://schemas.openxmlformats.org/presentationml/2006/main" showSpecialPlsOnTitleSld="0" saveSubsetFonts="1">
   <p:sldMasterIdLst>
-    <p:sldMasterId id="2147483843" r:id="rId1"/>
+    <p:sldMasterId id="2147483864" r:id="rId1"/>
   </p:sldMasterIdLst>
   <p:notesMasterIdLst>
     <p:notesMasterId r:id="rId87"/>
@@ -428,7 +428,7 @@
           <a:p>
             <a:fld id="{FCE9742F-4DAE-47F5-9244-6ACC3985DD6B}" type="datetimeFigureOut">
               <a:rPr lang="fr-BE" smtClean="0"/>
-              <a:t>07-11-24</a:t>
+              <a:t>14-01-25</a:t>
             </a:fld>
             <a:endParaRPr lang="fr-BE"/>
           </a:p>
@@ -1519,7 +1519,7 @@
 
 <file path=ppt/slideLayouts/slideLayout1.xml><?xml version="1.0" encoding="utf-8"?>
 <p:sldLayout xmlns:a="http://schemas.openxmlformats.org/drawingml/2006/main" xmlns:r="http://schemas.openxmlformats.org/officeDocument/2006/relationships" xmlns:p="http://schemas.openxmlformats.org/presentationml/2006/main" type="title" preserve="1">
-  <p:cSld name="Title Slide">
+  <p:cSld name="Diapositive de titre">
     <p:spTree>
       <p:nvGrpSpPr>
         <p:cNvPr id="1" name=""/>
@@ -1549,7 +1549,12 @@
             <a:off x="1524000" y="1122363"/>
             <a:ext cx="9144000" cy="2387600"/>
           </a:xfrm>
-          <a:noFill/>
+          <a:solidFill>
+            <a:schemeClr val="accent3">
+              <a:lumMod val="40000"/>
+              <a:lumOff val="60000"/>
+            </a:schemeClr>
+          </a:solidFill>
         </p:spPr>
         <p:txBody>
           <a:bodyPr anchor="b">
@@ -1557,7 +1562,7 @@
           </a:bodyPr>
           <a:lstStyle>
             <a:lvl1pPr algn="ctr">
-              <a:defRPr sz="4400">
+              <a:defRPr lang="fr-BE">
                 <a:solidFill>
                   <a:schemeClr val="accent2"/>
                 </a:solidFill>
@@ -1566,8 +1571,8 @@
           </a:lstStyle>
           <a:p>
             <a:r>
-              <a:rPr lang="en-US"/>
-              <a:t>Click to edit Master title style</a:t>
+              <a:rPr lang="fr-FR"/>
+              <a:t>Modifiez le style du titre</a:t>
             </a:r>
             <a:endParaRPr lang="fr-BE"/>
           </a:p>
@@ -1635,9 +1640,92 @@
           </a:lstStyle>
           <a:p>
             <a:r>
-              <a:rPr lang="en-US"/>
-              <a:t>Click to edit Master subtitle style</a:t>
-            </a:r>
+              <a:rPr lang="fr-FR"/>
+              <a:t>Modifiez le style des sous-titres du masque</a:t>
+            </a:r>
+            <a:endParaRPr lang="fr-BE"/>
+          </a:p>
+        </p:txBody>
+      </p:sp>
+      <p:sp>
+        <p:nvSpPr>
+          <p:cNvPr id="4" name="Espace réservé de la date 3">
+            <a:extLst>
+              <a:ext uri="{FF2B5EF4-FFF2-40B4-BE49-F238E27FC236}">
+                <a16:creationId xmlns:a16="http://schemas.microsoft.com/office/drawing/2014/main" id="{7F8EFA58-10A1-BAA7-B65E-A754A43B7544}"/>
+              </a:ext>
+            </a:extLst>
+          </p:cNvPr>
+          <p:cNvSpPr>
+            <a:spLocks noGrp="1"/>
+          </p:cNvSpPr>
+          <p:nvPr>
+            <p:ph type="dt" sz="half" idx="10"/>
+          </p:nvPr>
+        </p:nvSpPr>
+        <p:spPr/>
+        <p:txBody>
+          <a:bodyPr/>
+          <a:lstStyle/>
+          <a:p>
+            <a:fld id="{F3953782-D06E-4853-BE3C-64C197273937}" type="datetimeFigureOut">
+              <a:rPr lang="fr-BE" smtClean="0"/>
+              <a:t>14-01-25</a:t>
+            </a:fld>
+            <a:endParaRPr lang="fr-BE"/>
+          </a:p>
+        </p:txBody>
+      </p:sp>
+      <p:sp>
+        <p:nvSpPr>
+          <p:cNvPr id="5" name="Espace réservé du pied de page 4">
+            <a:extLst>
+              <a:ext uri="{FF2B5EF4-FFF2-40B4-BE49-F238E27FC236}">
+                <a16:creationId xmlns:a16="http://schemas.microsoft.com/office/drawing/2014/main" id="{314B8606-B65F-6EB2-899E-91B5C83E7578}"/>
+              </a:ext>
+            </a:extLst>
+          </p:cNvPr>
+          <p:cNvSpPr>
+            <a:spLocks noGrp="1"/>
+          </p:cNvSpPr>
+          <p:nvPr>
+            <p:ph type="ftr" sz="quarter" idx="11"/>
+          </p:nvPr>
+        </p:nvSpPr>
+        <p:spPr/>
+        <p:txBody>
+          <a:bodyPr/>
+          <a:lstStyle/>
+          <a:p>
+            <a:endParaRPr lang="fr-BE"/>
+          </a:p>
+        </p:txBody>
+      </p:sp>
+      <p:sp>
+        <p:nvSpPr>
+          <p:cNvPr id="6" name="Espace réservé du numéro de diapositive 5">
+            <a:extLst>
+              <a:ext uri="{FF2B5EF4-FFF2-40B4-BE49-F238E27FC236}">
+                <a16:creationId xmlns:a16="http://schemas.microsoft.com/office/drawing/2014/main" id="{CB2FA919-3ED3-80D3-E61B-53F97BE66BE0}"/>
+              </a:ext>
+            </a:extLst>
+          </p:cNvPr>
+          <p:cNvSpPr>
+            <a:spLocks noGrp="1"/>
+          </p:cNvSpPr>
+          <p:nvPr>
+            <p:ph type="sldNum" sz="quarter" idx="12"/>
+          </p:nvPr>
+        </p:nvSpPr>
+        <p:spPr/>
+        <p:txBody>
+          <a:bodyPr/>
+          <a:lstStyle/>
+          <a:p>
+            <a:fld id="{02C092ED-0E97-497E-99D9-BB9DD7276F53}" type="slidenum">
+              <a:rPr lang="fr-BE" smtClean="0"/>
+              <a:t>‹N°›</a:t>
+            </a:fld>
             <a:endParaRPr lang="fr-BE"/>
           </a:p>
         </p:txBody>
@@ -1645,7 +1733,7 @@
     </p:spTree>
     <p:extLst>
       <p:ext uri="{BB962C8B-B14F-4D97-AF65-F5344CB8AC3E}">
-        <p14:creationId xmlns:p14="http://schemas.microsoft.com/office/powerpoint/2010/main" val="3827274572"/>
+        <p14:creationId xmlns:p14="http://schemas.microsoft.com/office/powerpoint/2010/main" val="2755077362"/>
       </p:ext>
     </p:extLst>
   </p:cSld>
@@ -1664,128 +1752,12 @@
       </p:transition>
     </mc:Fallback>
   </mc:AlternateContent>
+  <p:hf hdr="0" ftr="0"/>
 </p:sldLayout>
 </file>
 
-<file path=ppt/slideLayouts/slideLayout2.xml><?xml version="1.0" encoding="utf-8"?>
-<p:sldLayout xmlns:a="http://schemas.openxmlformats.org/drawingml/2006/main" xmlns:r="http://schemas.openxmlformats.org/officeDocument/2006/relationships" xmlns:p="http://schemas.openxmlformats.org/presentationml/2006/main" type="obj" preserve="1">
-  <p:cSld name="Title and Content">
-    <p:spTree>
-      <p:nvGrpSpPr>
-        <p:cNvPr id="1" name=""/>
-        <p:cNvGrpSpPr/>
-        <p:nvPr/>
-      </p:nvGrpSpPr>
-      <p:grpSpPr>
-        <a:xfrm>
-          <a:off x="0" y="0"/>
-          <a:ext cx="0" cy="0"/>
-          <a:chOff x="0" y="0"/>
-          <a:chExt cx="0" cy="0"/>
-        </a:xfrm>
-      </p:grpSpPr>
-      <p:sp>
-        <p:nvSpPr>
-          <p:cNvPr id="2" name="Title 1"/>
-          <p:cNvSpPr>
-            <a:spLocks noGrp="1"/>
-          </p:cNvSpPr>
-          <p:nvPr>
-            <p:ph type="title"/>
-          </p:nvPr>
-        </p:nvSpPr>
-        <p:spPr/>
-        <p:txBody>
-          <a:bodyPr/>
-          <a:lstStyle/>
-          <a:p>
-            <a:r>
-              <a:rPr lang="en-US"/>
-              <a:t>Click to edit Master title style</a:t>
-            </a:r>
-            <a:endParaRPr lang="fr-BE"/>
-          </a:p>
-        </p:txBody>
-      </p:sp>
-      <p:sp>
-        <p:nvSpPr>
-          <p:cNvPr id="3" name="Content Placeholder 2"/>
-          <p:cNvSpPr>
-            <a:spLocks noGrp="1"/>
-          </p:cNvSpPr>
-          <p:nvPr>
-            <p:ph idx="1"/>
-          </p:nvPr>
-        </p:nvSpPr>
-        <p:spPr/>
-        <p:txBody>
-          <a:bodyPr/>
-          <a:lstStyle/>
-          <a:p>
-            <a:pPr lvl="0"/>
-            <a:r>
-              <a:rPr lang="en-US"/>
-              <a:t>Edit Master text styles</a:t>
-            </a:r>
-          </a:p>
-          <a:p>
-            <a:pPr lvl="1"/>
-            <a:r>
-              <a:rPr lang="en-US"/>
-              <a:t>Second level</a:t>
-            </a:r>
-          </a:p>
-          <a:p>
-            <a:pPr lvl="2"/>
-            <a:r>
-              <a:rPr lang="en-US"/>
-              <a:t>Third level</a:t>
-            </a:r>
-          </a:p>
-          <a:p>
-            <a:pPr lvl="3"/>
-            <a:r>
-              <a:rPr lang="en-US"/>
-              <a:t>Fourth level</a:t>
-            </a:r>
-          </a:p>
-          <a:p>
-            <a:pPr lvl="4"/>
-            <a:r>
-              <a:rPr lang="en-US"/>
-              <a:t>Fifth level</a:t>
-            </a:r>
-            <a:endParaRPr lang="fr-BE"/>
-          </a:p>
-        </p:txBody>
-      </p:sp>
-    </p:spTree>
-    <p:extLst>
-      <p:ext uri="{BB962C8B-B14F-4D97-AF65-F5344CB8AC3E}">
-        <p14:creationId xmlns:p14="http://schemas.microsoft.com/office/powerpoint/2010/main" val="1049464146"/>
-      </p:ext>
-    </p:extLst>
-  </p:cSld>
-  <p:clrMapOvr>
-    <a:masterClrMapping/>
-  </p:clrMapOvr>
-  <mc:AlternateContent xmlns:mc="http://schemas.openxmlformats.org/markup-compatibility/2006" xmlns:p14="http://schemas.microsoft.com/office/powerpoint/2010/main">
-    <mc:Choice Requires="p14">
-      <p:transition spd="slow">
-        <p14:reveal/>
-      </p:transition>
-    </mc:Choice>
-    <mc:Fallback xmlns="">
-      <p:transition spd="slow">
-        <p:fade/>
-      </p:transition>
-    </mc:Fallback>
-  </mc:AlternateContent>
-</p:sldLayout>
-</file>
-
-<file path=ppt/slideLayouts/slideLayout3.xml><?xml version="1.0" encoding="utf-8"?>
-<p:sldLayout xmlns:a="http://schemas.openxmlformats.org/drawingml/2006/main" xmlns:r="http://schemas.openxmlformats.org/officeDocument/2006/relationships" xmlns:p="http://schemas.openxmlformats.org/presentationml/2006/main" type="secHead" preserve="1">
+<file path=ppt/slideLayouts/slideLayout10.xml><?xml version="1.0" encoding="utf-8"?>
+<p:sldLayout xmlns:a="http://schemas.openxmlformats.org/drawingml/2006/main" xmlns:r="http://schemas.openxmlformats.org/officeDocument/2006/relationships" xmlns:p="http://schemas.openxmlformats.org/presentationml/2006/main" type="secHead">
   <p:cSld name="Section Header">
     <p:spTree>
       <p:nvGrpSpPr>
@@ -1957,7 +1929,7 @@
     </p:spTree>
     <p:extLst>
       <p:ext uri="{BB962C8B-B14F-4D97-AF65-F5344CB8AC3E}">
-        <p14:creationId xmlns:p14="http://schemas.microsoft.com/office/powerpoint/2010/main" val="2692224908"/>
+        <p14:creationId xmlns:p14="http://schemas.microsoft.com/office/powerpoint/2010/main" val="782572722"/>
       </p:ext>
     </p:extLst>
   </p:cSld>
@@ -1979,9 +1951,9 @@
 </p:sldLayout>
 </file>
 
-<file path=ppt/slideLayouts/slideLayout4.xml><?xml version="1.0" encoding="utf-8"?>
-<p:sldLayout xmlns:a="http://schemas.openxmlformats.org/drawingml/2006/main" xmlns:r="http://schemas.openxmlformats.org/officeDocument/2006/relationships" xmlns:p="http://schemas.openxmlformats.org/presentationml/2006/main" type="twoObj" preserve="1">
-  <p:cSld name="Two Content">
+<file path=ppt/slideLayouts/slideLayout2.xml><?xml version="1.0" encoding="utf-8"?>
+<p:sldLayout xmlns:a="http://schemas.openxmlformats.org/drawingml/2006/main" xmlns:r="http://schemas.openxmlformats.org/officeDocument/2006/relationships" xmlns:p="http://schemas.openxmlformats.org/presentationml/2006/main" type="obj" preserve="1">
+  <p:cSld name="Titre et contenu">
     <p:spTree>
       <p:nvGrpSpPr>
         <p:cNvPr id="1" name=""/>
@@ -2012,8 +1984,8 @@
           <a:lstStyle/>
           <a:p>
             <a:r>
-              <a:rPr lang="en-US"/>
-              <a:t>Click to edit Master title style</a:t>
+              <a:rPr lang="fr-FR"/>
+              <a:t>Modifiez le style du titre</a:t>
             </a:r>
             <a:endParaRPr lang="fr-BE"/>
           </a:p>
@@ -2026,13 +1998,13 @@
             <a:spLocks noGrp="1"/>
           </p:cNvSpPr>
           <p:nvPr>
-            <p:ph sz="half" idx="1"/>
+            <p:ph idx="1"/>
           </p:nvPr>
         </p:nvSpPr>
         <p:spPr>
           <a:xfrm>
-            <a:off x="838200" y="1825625"/>
-            <a:ext cx="5181600" cy="4351339"/>
+            <a:off x="838200" y="1690689"/>
+            <a:ext cx="10515600" cy="4486276"/>
           </a:xfrm>
         </p:spPr>
         <p:txBody>
@@ -2041,36 +2013,36 @@
           <a:p>
             <a:pPr lvl="0"/>
             <a:r>
-              <a:rPr lang="en-US"/>
-              <a:t>Edit Master text styles</a:t>
+              <a:rPr lang="fr-FR"/>
+              <a:t>Cliquez pour modifier les styles du texte du masque</a:t>
             </a:r>
           </a:p>
           <a:p>
             <a:pPr lvl="1"/>
             <a:r>
-              <a:rPr lang="en-US"/>
-              <a:t>Second level</a:t>
+              <a:rPr lang="fr-FR"/>
+              <a:t>Deuxième niveau</a:t>
             </a:r>
           </a:p>
           <a:p>
             <a:pPr lvl="2"/>
             <a:r>
-              <a:rPr lang="en-US"/>
-              <a:t>Third level</a:t>
+              <a:rPr lang="fr-FR"/>
+              <a:t>Troisième niveau</a:t>
             </a:r>
           </a:p>
           <a:p>
             <a:pPr lvl="3"/>
             <a:r>
-              <a:rPr lang="en-US"/>
-              <a:t>Fourth level</a:t>
+              <a:rPr lang="fr-FR"/>
+              <a:t>Quatrième niveau</a:t>
             </a:r>
           </a:p>
           <a:p>
             <a:pPr lvl="4"/>
             <a:r>
-              <a:rPr lang="en-US"/>
-              <a:t>Fifth level</a:t>
+              <a:rPr lang="fr-FR"/>
+              <a:t>Cinquième niveau</a:t>
             </a:r>
             <a:endParaRPr lang="fr-BE"/>
           </a:p>
@@ -2078,57 +2050,400 @@
       </p:sp>
       <p:sp>
         <p:nvSpPr>
-          <p:cNvPr id="4" name="Content Placeholder 3"/>
+          <p:cNvPr id="4" name="Espace réservé de la date 3">
+            <a:extLst>
+              <a:ext uri="{FF2B5EF4-FFF2-40B4-BE49-F238E27FC236}">
+                <a16:creationId xmlns:a16="http://schemas.microsoft.com/office/drawing/2014/main" id="{3268EF8D-0946-4672-F93D-1040FBC99710}"/>
+              </a:ext>
+            </a:extLst>
+          </p:cNvPr>
           <p:cNvSpPr>
             <a:spLocks noGrp="1"/>
           </p:cNvSpPr>
           <p:nvPr>
-            <p:ph sz="half" idx="2"/>
+            <p:ph type="dt" sz="half" idx="10"/>
+          </p:nvPr>
+        </p:nvSpPr>
+        <p:spPr/>
+        <p:txBody>
+          <a:bodyPr/>
+          <a:lstStyle/>
+          <a:p>
+            <a:fld id="{F3953782-D06E-4853-BE3C-64C197273937}" type="datetimeFigureOut">
+              <a:rPr lang="fr-BE" smtClean="0"/>
+              <a:t>14-01-25</a:t>
+            </a:fld>
+            <a:endParaRPr lang="fr-BE"/>
+          </a:p>
+        </p:txBody>
+      </p:sp>
+      <p:sp>
+        <p:nvSpPr>
+          <p:cNvPr id="5" name="Espace réservé du pied de page 4">
+            <a:extLst>
+              <a:ext uri="{FF2B5EF4-FFF2-40B4-BE49-F238E27FC236}">
+                <a16:creationId xmlns:a16="http://schemas.microsoft.com/office/drawing/2014/main" id="{8F8A40D7-7FAD-432F-7B9F-71125A565A95}"/>
+              </a:ext>
+            </a:extLst>
+          </p:cNvPr>
+          <p:cNvSpPr>
+            <a:spLocks noGrp="1"/>
+          </p:cNvSpPr>
+          <p:nvPr>
+            <p:ph type="ftr" sz="quarter" idx="11"/>
+          </p:nvPr>
+        </p:nvSpPr>
+        <p:spPr/>
+        <p:txBody>
+          <a:bodyPr/>
+          <a:lstStyle/>
+          <a:p>
+            <a:endParaRPr lang="fr-BE"/>
+          </a:p>
+        </p:txBody>
+      </p:sp>
+      <p:sp>
+        <p:nvSpPr>
+          <p:cNvPr id="6" name="Espace réservé du numéro de diapositive 5">
+            <a:extLst>
+              <a:ext uri="{FF2B5EF4-FFF2-40B4-BE49-F238E27FC236}">
+                <a16:creationId xmlns:a16="http://schemas.microsoft.com/office/drawing/2014/main" id="{54A3E5DF-3F32-A840-9AC0-4B04DF13C487}"/>
+              </a:ext>
+            </a:extLst>
+          </p:cNvPr>
+          <p:cNvSpPr>
+            <a:spLocks noGrp="1"/>
+          </p:cNvSpPr>
+          <p:nvPr>
+            <p:ph type="sldNum" sz="quarter" idx="12"/>
+          </p:nvPr>
+        </p:nvSpPr>
+        <p:spPr/>
+        <p:txBody>
+          <a:bodyPr/>
+          <a:lstStyle/>
+          <a:p>
+            <a:fld id="{02C092ED-0E97-497E-99D9-BB9DD7276F53}" type="slidenum">
+              <a:rPr lang="fr-BE" smtClean="0"/>
+              <a:t>‹N°›</a:t>
+            </a:fld>
+            <a:endParaRPr lang="fr-BE"/>
+          </a:p>
+        </p:txBody>
+      </p:sp>
+    </p:spTree>
+    <p:extLst>
+      <p:ext uri="{BB962C8B-B14F-4D97-AF65-F5344CB8AC3E}">
+        <p14:creationId xmlns:p14="http://schemas.microsoft.com/office/powerpoint/2010/main" val="1837349057"/>
+      </p:ext>
+    </p:extLst>
+  </p:cSld>
+  <p:clrMapOvr>
+    <a:masterClrMapping/>
+  </p:clrMapOvr>
+  <mc:AlternateContent xmlns:mc="http://schemas.openxmlformats.org/markup-compatibility/2006" xmlns:p14="http://schemas.microsoft.com/office/powerpoint/2010/main">
+    <mc:Choice Requires="p14">
+      <p:transition spd="slow">
+        <p14:reveal/>
+      </p:transition>
+    </mc:Choice>
+    <mc:Fallback xmlns="">
+      <p:transition spd="slow">
+        <p:fade/>
+      </p:transition>
+    </mc:Fallback>
+  </mc:AlternateContent>
+  <p:hf hdr="0" ftr="0"/>
+</p:sldLayout>
+</file>
+
+<file path=ppt/slideLayouts/slideLayout3.xml><?xml version="1.0" encoding="utf-8"?>
+<p:sldLayout xmlns:a="http://schemas.openxmlformats.org/drawingml/2006/main" xmlns:r="http://schemas.openxmlformats.org/officeDocument/2006/relationships" xmlns:p="http://schemas.openxmlformats.org/presentationml/2006/main" preserve="1">
+  <p:cSld name="Titre de section">
+    <p:spTree>
+      <p:nvGrpSpPr>
+        <p:cNvPr id="1" name=""/>
+        <p:cNvGrpSpPr/>
+        <p:nvPr/>
+      </p:nvGrpSpPr>
+      <p:grpSpPr>
+        <a:xfrm>
+          <a:off x="0" y="0"/>
+          <a:ext cx="0" cy="0"/>
+          <a:chOff x="0" y="0"/>
+          <a:chExt cx="0" cy="0"/>
+        </a:xfrm>
+      </p:grpSpPr>
+      <p:sp>
+        <p:nvSpPr>
+          <p:cNvPr id="2" name="Title 1"/>
+          <p:cNvSpPr>
+            <a:spLocks noGrp="1"/>
+          </p:cNvSpPr>
+          <p:nvPr>
+            <p:ph type="title"/>
           </p:nvPr>
         </p:nvSpPr>
         <p:spPr>
           <a:xfrm>
-            <a:off x="6172200" y="1825625"/>
-            <a:ext cx="5181600" cy="4351339"/>
+            <a:off x="831851" y="1709740"/>
+            <a:ext cx="10515600" cy="2852737"/>
+          </a:xfrm>
+        </p:spPr>
+        <p:txBody>
+          <a:bodyPr anchor="b">
+            <a:normAutofit/>
+          </a:bodyPr>
+          <a:lstStyle>
+            <a:lvl1pPr>
+              <a:defRPr lang="fr-BE">
+                <a:solidFill>
+                  <a:schemeClr val="accent2"/>
+                </a:solidFill>
+              </a:defRPr>
+            </a:lvl1pPr>
+          </a:lstStyle>
+          <a:p>
+            <a:r>
+              <a:rPr lang="fr-FR"/>
+              <a:t>Modifiez le style du titre</a:t>
+            </a:r>
+            <a:endParaRPr lang="fr-BE"/>
+          </a:p>
+        </p:txBody>
+      </p:sp>
+      <p:sp>
+        <p:nvSpPr>
+          <p:cNvPr id="3" name="Text Placeholder 2"/>
+          <p:cNvSpPr>
+            <a:spLocks noGrp="1"/>
+          </p:cNvSpPr>
+          <p:nvPr>
+            <p:ph type="body" idx="1"/>
+          </p:nvPr>
+        </p:nvSpPr>
+        <p:spPr>
+          <a:xfrm>
+            <a:off x="831851" y="4589464"/>
+            <a:ext cx="10515600" cy="1500187"/>
+          </a:xfrm>
+        </p:spPr>
+        <p:txBody>
+          <a:bodyPr/>
+          <a:lstStyle>
+            <a:lvl1pPr marL="0" indent="0">
+              <a:buNone/>
+              <a:defRPr sz="2400">
+                <a:solidFill>
+                  <a:schemeClr val="tx1">
+                    <a:tint val="75000"/>
+                  </a:schemeClr>
+                </a:solidFill>
+              </a:defRPr>
+            </a:lvl1pPr>
+            <a:lvl2pPr marL="457189" indent="0">
+              <a:buNone/>
+              <a:defRPr sz="2000">
+                <a:solidFill>
+                  <a:schemeClr val="tx1">
+                    <a:tint val="75000"/>
+                  </a:schemeClr>
+                </a:solidFill>
+              </a:defRPr>
+            </a:lvl2pPr>
+            <a:lvl3pPr marL="914377" indent="0">
+              <a:buNone/>
+              <a:defRPr sz="1800">
+                <a:solidFill>
+                  <a:schemeClr val="tx1">
+                    <a:tint val="75000"/>
+                  </a:schemeClr>
+                </a:solidFill>
+              </a:defRPr>
+            </a:lvl3pPr>
+            <a:lvl4pPr marL="1371566" indent="0">
+              <a:buNone/>
+              <a:defRPr sz="1600">
+                <a:solidFill>
+                  <a:schemeClr val="tx1">
+                    <a:tint val="75000"/>
+                  </a:schemeClr>
+                </a:solidFill>
+              </a:defRPr>
+            </a:lvl4pPr>
+            <a:lvl5pPr marL="1828754" indent="0">
+              <a:buNone/>
+              <a:defRPr sz="1600">
+                <a:solidFill>
+                  <a:schemeClr val="tx1">
+                    <a:tint val="75000"/>
+                  </a:schemeClr>
+                </a:solidFill>
+              </a:defRPr>
+            </a:lvl5pPr>
+            <a:lvl6pPr marL="2285943" indent="0">
+              <a:buNone/>
+              <a:defRPr sz="1600">
+                <a:solidFill>
+                  <a:schemeClr val="tx1">
+                    <a:tint val="75000"/>
+                  </a:schemeClr>
+                </a:solidFill>
+              </a:defRPr>
+            </a:lvl6pPr>
+            <a:lvl7pPr marL="2743131" indent="0">
+              <a:buNone/>
+              <a:defRPr sz="1600">
+                <a:solidFill>
+                  <a:schemeClr val="tx1">
+                    <a:tint val="75000"/>
+                  </a:schemeClr>
+                </a:solidFill>
+              </a:defRPr>
+            </a:lvl7pPr>
+            <a:lvl8pPr marL="3200320" indent="0">
+              <a:buNone/>
+              <a:defRPr sz="1600">
+                <a:solidFill>
+                  <a:schemeClr val="tx1">
+                    <a:tint val="75000"/>
+                  </a:schemeClr>
+                </a:solidFill>
+              </a:defRPr>
+            </a:lvl8pPr>
+            <a:lvl9pPr marL="3657509" indent="0">
+              <a:buNone/>
+              <a:defRPr sz="1600">
+                <a:solidFill>
+                  <a:schemeClr val="tx1">
+                    <a:tint val="75000"/>
+                  </a:schemeClr>
+                </a:solidFill>
+              </a:defRPr>
+            </a:lvl9pPr>
+          </a:lstStyle>
+          <a:p>
+            <a:pPr lvl="0"/>
+            <a:r>
+              <a:rPr lang="fr-FR"/>
+              <a:t>Cliquez pour modifier les styles du texte du masque</a:t>
+            </a:r>
+          </a:p>
+        </p:txBody>
+      </p:sp>
+      <p:sp>
+        <p:nvSpPr>
+          <p:cNvPr id="5" name="Espace réservé pour une image  4">
+            <a:extLst>
+              <a:ext uri="{FF2B5EF4-FFF2-40B4-BE49-F238E27FC236}">
+                <a16:creationId xmlns:a16="http://schemas.microsoft.com/office/drawing/2014/main" id="{83B7C617-6903-4988-8F47-3C72C68028FF}"/>
+              </a:ext>
+            </a:extLst>
+          </p:cNvPr>
+          <p:cNvSpPr>
+            <a:spLocks noGrp="1"/>
+          </p:cNvSpPr>
+          <p:nvPr>
+            <p:ph type="pic" sz="quarter" idx="10"/>
+          </p:nvPr>
+        </p:nvSpPr>
+        <p:spPr>
+          <a:xfrm>
+            <a:off x="9000000" y="720000"/>
+            <a:ext cx="2160000" cy="2160000"/>
           </a:xfrm>
         </p:spPr>
         <p:txBody>
           <a:bodyPr/>
           <a:lstStyle/>
           <a:p>
-            <a:pPr lvl="0"/>
-            <a:r>
-              <a:rPr lang="en-US"/>
-              <a:t>Edit Master text styles</a:t>
-            </a:r>
-          </a:p>
-          <a:p>
-            <a:pPr lvl="1"/>
-            <a:r>
-              <a:rPr lang="en-US"/>
-              <a:t>Second level</a:t>
-            </a:r>
-          </a:p>
-          <a:p>
-            <a:pPr lvl="2"/>
-            <a:r>
-              <a:rPr lang="en-US"/>
-              <a:t>Third level</a:t>
-            </a:r>
-          </a:p>
-          <a:p>
-            <a:pPr lvl="3"/>
-            <a:r>
-              <a:rPr lang="en-US"/>
-              <a:t>Fourth level</a:t>
-            </a:r>
-          </a:p>
-          <a:p>
-            <a:pPr lvl="4"/>
-            <a:r>
-              <a:rPr lang="en-US"/>
-              <a:t>Fifth level</a:t>
-            </a:r>
+            <a:r>
+              <a:rPr lang="fr-FR"/>
+              <a:t>Cliquez sur l'icône pour ajouter une image</a:t>
+            </a:r>
+            <a:endParaRPr lang="fr-BE" dirty="0"/>
+          </a:p>
+        </p:txBody>
+      </p:sp>
+      <p:sp>
+        <p:nvSpPr>
+          <p:cNvPr id="4" name="Espace réservé de la date 3">
+            <a:extLst>
+              <a:ext uri="{FF2B5EF4-FFF2-40B4-BE49-F238E27FC236}">
+                <a16:creationId xmlns:a16="http://schemas.microsoft.com/office/drawing/2014/main" id="{F2D67B63-F450-35EF-442C-62311487D2F4}"/>
+              </a:ext>
+            </a:extLst>
+          </p:cNvPr>
+          <p:cNvSpPr>
+            <a:spLocks noGrp="1"/>
+          </p:cNvSpPr>
+          <p:nvPr>
+            <p:ph type="dt" sz="half" idx="11"/>
+          </p:nvPr>
+        </p:nvSpPr>
+        <p:spPr/>
+        <p:txBody>
+          <a:bodyPr/>
+          <a:lstStyle/>
+          <a:p>
+            <a:fld id="{F3953782-D06E-4853-BE3C-64C197273937}" type="datetimeFigureOut">
+              <a:rPr lang="fr-BE" smtClean="0"/>
+              <a:t>14-01-25</a:t>
+            </a:fld>
+            <a:endParaRPr lang="fr-BE"/>
+          </a:p>
+        </p:txBody>
+      </p:sp>
+      <p:sp>
+        <p:nvSpPr>
+          <p:cNvPr id="6" name="Espace réservé du pied de page 5">
+            <a:extLst>
+              <a:ext uri="{FF2B5EF4-FFF2-40B4-BE49-F238E27FC236}">
+                <a16:creationId xmlns:a16="http://schemas.microsoft.com/office/drawing/2014/main" id="{EBC20ED6-7274-FD2F-773B-9069D53732E9}"/>
+              </a:ext>
+            </a:extLst>
+          </p:cNvPr>
+          <p:cNvSpPr>
+            <a:spLocks noGrp="1"/>
+          </p:cNvSpPr>
+          <p:nvPr>
+            <p:ph type="ftr" sz="quarter" idx="12"/>
+          </p:nvPr>
+        </p:nvSpPr>
+        <p:spPr/>
+        <p:txBody>
+          <a:bodyPr/>
+          <a:lstStyle/>
+          <a:p>
+            <a:endParaRPr lang="fr-BE"/>
+          </a:p>
+        </p:txBody>
+      </p:sp>
+      <p:sp>
+        <p:nvSpPr>
+          <p:cNvPr id="7" name="Espace réservé du numéro de diapositive 6">
+            <a:extLst>
+              <a:ext uri="{FF2B5EF4-FFF2-40B4-BE49-F238E27FC236}">
+                <a16:creationId xmlns:a16="http://schemas.microsoft.com/office/drawing/2014/main" id="{DB282271-26EC-908B-2E9D-6EE95CFBEB1C}"/>
+              </a:ext>
+            </a:extLst>
+          </p:cNvPr>
+          <p:cNvSpPr>
+            <a:spLocks noGrp="1"/>
+          </p:cNvSpPr>
+          <p:nvPr>
+            <p:ph type="sldNum" sz="quarter" idx="13"/>
+          </p:nvPr>
+        </p:nvSpPr>
+        <p:spPr/>
+        <p:txBody>
+          <a:bodyPr/>
+          <a:lstStyle/>
+          <a:p>
+            <a:fld id="{02C092ED-0E97-497E-99D9-BB9DD7276F53}" type="slidenum">
+              <a:rPr lang="fr-BE" smtClean="0"/>
+              <a:t>‹N°›</a:t>
+            </a:fld>
             <a:endParaRPr lang="fr-BE"/>
           </a:p>
         </p:txBody>
@@ -2136,7 +2451,205 @@
     </p:spTree>
     <p:extLst>
       <p:ext uri="{BB962C8B-B14F-4D97-AF65-F5344CB8AC3E}">
-        <p14:creationId xmlns:p14="http://schemas.microsoft.com/office/powerpoint/2010/main" val="2662045599"/>
+        <p14:creationId xmlns:p14="http://schemas.microsoft.com/office/powerpoint/2010/main" val="3811550420"/>
+      </p:ext>
+    </p:extLst>
+  </p:cSld>
+  <p:clrMapOvr>
+    <a:masterClrMapping/>
+  </p:clrMapOvr>
+  <mc:AlternateContent xmlns:mc="http://schemas.openxmlformats.org/markup-compatibility/2006" xmlns:p14="http://schemas.microsoft.com/office/powerpoint/2010/main">
+    <mc:Choice Requires="p14">
+      <p:transition spd="slow">
+        <p14:reveal/>
+      </p:transition>
+    </mc:Choice>
+    <mc:Fallback xmlns="">
+      <p:transition spd="slow">
+        <p:fade/>
+      </p:transition>
+    </mc:Fallback>
+  </mc:AlternateContent>
+  <p:hf hdr="0" ftr="0"/>
+</p:sldLayout>
+</file>
+
+<file path=ppt/slideLayouts/slideLayout4.xml><?xml version="1.0" encoding="utf-8"?>
+<p:sldLayout xmlns:a="http://schemas.openxmlformats.org/drawingml/2006/main" xmlns:r="http://schemas.openxmlformats.org/officeDocument/2006/relationships" xmlns:p="http://schemas.openxmlformats.org/presentationml/2006/main" preserve="1">
+  <p:cSld name="Sub-Section Header">
+    <p:spTree>
+      <p:nvGrpSpPr>
+        <p:cNvPr id="1" name=""/>
+        <p:cNvGrpSpPr/>
+        <p:nvPr/>
+      </p:nvGrpSpPr>
+      <p:grpSpPr>
+        <a:xfrm>
+          <a:off x="0" y="0"/>
+          <a:ext cx="0" cy="0"/>
+          <a:chOff x="0" y="0"/>
+          <a:chExt cx="0" cy="0"/>
+        </a:xfrm>
+      </p:grpSpPr>
+      <p:sp>
+        <p:nvSpPr>
+          <p:cNvPr id="2" name="Title 1"/>
+          <p:cNvSpPr>
+            <a:spLocks noGrp="1"/>
+          </p:cNvSpPr>
+          <p:nvPr>
+            <p:ph type="title"/>
+          </p:nvPr>
+        </p:nvSpPr>
+        <p:spPr>
+          <a:xfrm>
+            <a:off x="831851" y="4544704"/>
+            <a:ext cx="10515600" cy="1628211"/>
+          </a:xfrm>
+        </p:spPr>
+        <p:txBody>
+          <a:bodyPr anchor="b">
+            <a:normAutofit/>
+          </a:bodyPr>
+          <a:lstStyle>
+            <a:lvl1pPr>
+              <a:defRPr sz="3600">
+                <a:solidFill>
+                  <a:schemeClr val="accent2"/>
+                </a:solidFill>
+              </a:defRPr>
+            </a:lvl1pPr>
+          </a:lstStyle>
+          <a:p>
+            <a:r>
+              <a:rPr lang="fr-FR"/>
+              <a:t>Modifiez le style du titre</a:t>
+            </a:r>
+            <a:endParaRPr lang="fr-BE" dirty="0"/>
+          </a:p>
+        </p:txBody>
+      </p:sp>
+      <p:sp>
+        <p:nvSpPr>
+          <p:cNvPr id="5" name="Espace réservé pour une image  4">
+            <a:extLst>
+              <a:ext uri="{FF2B5EF4-FFF2-40B4-BE49-F238E27FC236}">
+                <a16:creationId xmlns:a16="http://schemas.microsoft.com/office/drawing/2014/main" id="{4FDD30A2-EFB1-4B31-8365-64458F4E13E2}"/>
+              </a:ext>
+            </a:extLst>
+          </p:cNvPr>
+          <p:cNvSpPr>
+            <a:spLocks noGrp="1"/>
+          </p:cNvSpPr>
+          <p:nvPr>
+            <p:ph type="pic" sz="quarter" idx="10"/>
+          </p:nvPr>
+        </p:nvSpPr>
+        <p:spPr>
+          <a:xfrm>
+            <a:off x="9000000" y="720000"/>
+            <a:ext cx="1440000" cy="1440000"/>
+          </a:xfrm>
+        </p:spPr>
+        <p:txBody>
+          <a:bodyPr/>
+          <a:lstStyle/>
+          <a:p>
+            <a:r>
+              <a:rPr lang="fr-FR"/>
+              <a:t>Cliquez sur l'icône pour ajouter une image</a:t>
+            </a:r>
+            <a:endParaRPr lang="fr-BE" dirty="0"/>
+          </a:p>
+        </p:txBody>
+      </p:sp>
+      <p:sp>
+        <p:nvSpPr>
+          <p:cNvPr id="3" name="Espace réservé de la date 2">
+            <a:extLst>
+              <a:ext uri="{FF2B5EF4-FFF2-40B4-BE49-F238E27FC236}">
+                <a16:creationId xmlns:a16="http://schemas.microsoft.com/office/drawing/2014/main" id="{B8BD7575-5E4D-B6F7-D511-002E7EBB1A2F}"/>
+              </a:ext>
+            </a:extLst>
+          </p:cNvPr>
+          <p:cNvSpPr>
+            <a:spLocks noGrp="1"/>
+          </p:cNvSpPr>
+          <p:nvPr>
+            <p:ph type="dt" sz="half" idx="11"/>
+          </p:nvPr>
+        </p:nvSpPr>
+        <p:spPr/>
+        <p:txBody>
+          <a:bodyPr/>
+          <a:lstStyle/>
+          <a:p>
+            <a:fld id="{F3953782-D06E-4853-BE3C-64C197273937}" type="datetimeFigureOut">
+              <a:rPr lang="fr-BE" smtClean="0"/>
+              <a:t>14-01-25</a:t>
+            </a:fld>
+            <a:endParaRPr lang="fr-BE"/>
+          </a:p>
+        </p:txBody>
+      </p:sp>
+      <p:sp>
+        <p:nvSpPr>
+          <p:cNvPr id="4" name="Espace réservé du pied de page 3">
+            <a:extLst>
+              <a:ext uri="{FF2B5EF4-FFF2-40B4-BE49-F238E27FC236}">
+                <a16:creationId xmlns:a16="http://schemas.microsoft.com/office/drawing/2014/main" id="{F57AA542-0BD3-6896-CFBC-925661457ED8}"/>
+              </a:ext>
+            </a:extLst>
+          </p:cNvPr>
+          <p:cNvSpPr>
+            <a:spLocks noGrp="1"/>
+          </p:cNvSpPr>
+          <p:nvPr>
+            <p:ph type="ftr" sz="quarter" idx="12"/>
+          </p:nvPr>
+        </p:nvSpPr>
+        <p:spPr/>
+        <p:txBody>
+          <a:bodyPr/>
+          <a:lstStyle/>
+          <a:p>
+            <a:endParaRPr lang="fr-BE"/>
+          </a:p>
+        </p:txBody>
+      </p:sp>
+      <p:sp>
+        <p:nvSpPr>
+          <p:cNvPr id="6" name="Espace réservé du numéro de diapositive 5">
+            <a:extLst>
+              <a:ext uri="{FF2B5EF4-FFF2-40B4-BE49-F238E27FC236}">
+                <a16:creationId xmlns:a16="http://schemas.microsoft.com/office/drawing/2014/main" id="{FF1D4A95-E4A4-1574-4F11-DE8F1961354B}"/>
+              </a:ext>
+            </a:extLst>
+          </p:cNvPr>
+          <p:cNvSpPr>
+            <a:spLocks noGrp="1"/>
+          </p:cNvSpPr>
+          <p:nvPr>
+            <p:ph type="sldNum" sz="quarter" idx="13"/>
+          </p:nvPr>
+        </p:nvSpPr>
+        <p:spPr/>
+        <p:txBody>
+          <a:bodyPr/>
+          <a:lstStyle/>
+          <a:p>
+            <a:fld id="{02C092ED-0E97-497E-99D9-BB9DD7276F53}" type="slidenum">
+              <a:rPr lang="fr-BE" smtClean="0"/>
+              <a:t>‹N°›</a:t>
+            </a:fld>
+            <a:endParaRPr lang="fr-BE"/>
+          </a:p>
+        </p:txBody>
+      </p:sp>
+    </p:spTree>
+    <p:extLst>
+      <p:ext uri="{BB962C8B-B14F-4D97-AF65-F5344CB8AC3E}">
+        <p14:creationId xmlns:p14="http://schemas.microsoft.com/office/powerpoint/2010/main" val="279888428"/>
       </p:ext>
     </p:extLst>
   </p:cSld>
@@ -2160,8 +2673,271 @@
 </file>
 
 <file path=ppt/slideLayouts/slideLayout5.xml><?xml version="1.0" encoding="utf-8"?>
+<p:sldLayout xmlns:a="http://schemas.openxmlformats.org/drawingml/2006/main" xmlns:r="http://schemas.openxmlformats.org/officeDocument/2006/relationships" xmlns:p="http://schemas.openxmlformats.org/presentationml/2006/main" type="twoObj" preserve="1">
+  <p:cSld name="Deux contenus">
+    <p:spTree>
+      <p:nvGrpSpPr>
+        <p:cNvPr id="1" name=""/>
+        <p:cNvGrpSpPr/>
+        <p:nvPr/>
+      </p:nvGrpSpPr>
+      <p:grpSpPr>
+        <a:xfrm>
+          <a:off x="0" y="0"/>
+          <a:ext cx="0" cy="0"/>
+          <a:chOff x="0" y="0"/>
+          <a:chExt cx="0" cy="0"/>
+        </a:xfrm>
+      </p:grpSpPr>
+      <p:sp>
+        <p:nvSpPr>
+          <p:cNvPr id="2" name="Title 1"/>
+          <p:cNvSpPr>
+            <a:spLocks noGrp="1"/>
+          </p:cNvSpPr>
+          <p:nvPr>
+            <p:ph type="title"/>
+          </p:nvPr>
+        </p:nvSpPr>
+        <p:spPr/>
+        <p:txBody>
+          <a:bodyPr/>
+          <a:lstStyle/>
+          <a:p>
+            <a:r>
+              <a:rPr lang="fr-FR"/>
+              <a:t>Modifiez le style du titre</a:t>
+            </a:r>
+            <a:endParaRPr lang="fr-BE"/>
+          </a:p>
+        </p:txBody>
+      </p:sp>
+      <p:sp>
+        <p:nvSpPr>
+          <p:cNvPr id="3" name="Content Placeholder 2"/>
+          <p:cNvSpPr>
+            <a:spLocks noGrp="1"/>
+          </p:cNvSpPr>
+          <p:nvPr>
+            <p:ph sz="half" idx="1"/>
+          </p:nvPr>
+        </p:nvSpPr>
+        <p:spPr>
+          <a:xfrm>
+            <a:off x="838200" y="1690689"/>
+            <a:ext cx="5181600" cy="4486276"/>
+          </a:xfrm>
+        </p:spPr>
+        <p:txBody>
+          <a:bodyPr/>
+          <a:lstStyle/>
+          <a:p>
+            <a:pPr lvl="0"/>
+            <a:r>
+              <a:rPr lang="fr-FR"/>
+              <a:t>Cliquez pour modifier les styles du texte du masque</a:t>
+            </a:r>
+          </a:p>
+          <a:p>
+            <a:pPr lvl="1"/>
+            <a:r>
+              <a:rPr lang="fr-FR"/>
+              <a:t>Deuxième niveau</a:t>
+            </a:r>
+          </a:p>
+          <a:p>
+            <a:pPr lvl="2"/>
+            <a:r>
+              <a:rPr lang="fr-FR"/>
+              <a:t>Troisième niveau</a:t>
+            </a:r>
+          </a:p>
+          <a:p>
+            <a:pPr lvl="3"/>
+            <a:r>
+              <a:rPr lang="fr-FR"/>
+              <a:t>Quatrième niveau</a:t>
+            </a:r>
+          </a:p>
+          <a:p>
+            <a:pPr lvl="4"/>
+            <a:r>
+              <a:rPr lang="fr-FR"/>
+              <a:t>Cinquième niveau</a:t>
+            </a:r>
+            <a:endParaRPr lang="fr-BE" dirty="0"/>
+          </a:p>
+        </p:txBody>
+      </p:sp>
+      <p:sp>
+        <p:nvSpPr>
+          <p:cNvPr id="4" name="Content Placeholder 3"/>
+          <p:cNvSpPr>
+            <a:spLocks noGrp="1"/>
+          </p:cNvSpPr>
+          <p:nvPr>
+            <p:ph sz="half" idx="2"/>
+          </p:nvPr>
+        </p:nvSpPr>
+        <p:spPr>
+          <a:xfrm>
+            <a:off x="6172200" y="1690689"/>
+            <a:ext cx="5181600" cy="4486276"/>
+          </a:xfrm>
+        </p:spPr>
+        <p:txBody>
+          <a:bodyPr/>
+          <a:lstStyle/>
+          <a:p>
+            <a:pPr lvl="0"/>
+            <a:r>
+              <a:rPr lang="fr-FR"/>
+              <a:t>Cliquez pour modifier les styles du texte du masque</a:t>
+            </a:r>
+          </a:p>
+          <a:p>
+            <a:pPr lvl="1"/>
+            <a:r>
+              <a:rPr lang="fr-FR"/>
+              <a:t>Deuxième niveau</a:t>
+            </a:r>
+          </a:p>
+          <a:p>
+            <a:pPr lvl="2"/>
+            <a:r>
+              <a:rPr lang="fr-FR"/>
+              <a:t>Troisième niveau</a:t>
+            </a:r>
+          </a:p>
+          <a:p>
+            <a:pPr lvl="3"/>
+            <a:r>
+              <a:rPr lang="fr-FR"/>
+              <a:t>Quatrième niveau</a:t>
+            </a:r>
+          </a:p>
+          <a:p>
+            <a:pPr lvl="4"/>
+            <a:r>
+              <a:rPr lang="fr-FR"/>
+              <a:t>Cinquième niveau</a:t>
+            </a:r>
+            <a:endParaRPr lang="fr-BE" dirty="0"/>
+          </a:p>
+        </p:txBody>
+      </p:sp>
+      <p:sp>
+        <p:nvSpPr>
+          <p:cNvPr id="5" name="Espace réservé de la date 4">
+            <a:extLst>
+              <a:ext uri="{FF2B5EF4-FFF2-40B4-BE49-F238E27FC236}">
+                <a16:creationId xmlns:a16="http://schemas.microsoft.com/office/drawing/2014/main" id="{023EE368-836F-D6B7-3720-94E515B8ED49}"/>
+              </a:ext>
+            </a:extLst>
+          </p:cNvPr>
+          <p:cNvSpPr>
+            <a:spLocks noGrp="1"/>
+          </p:cNvSpPr>
+          <p:nvPr>
+            <p:ph type="dt" sz="half" idx="10"/>
+          </p:nvPr>
+        </p:nvSpPr>
+        <p:spPr/>
+        <p:txBody>
+          <a:bodyPr/>
+          <a:lstStyle/>
+          <a:p>
+            <a:fld id="{F3953782-D06E-4853-BE3C-64C197273937}" type="datetimeFigureOut">
+              <a:rPr lang="fr-BE" smtClean="0"/>
+              <a:t>14-01-25</a:t>
+            </a:fld>
+            <a:endParaRPr lang="fr-BE"/>
+          </a:p>
+        </p:txBody>
+      </p:sp>
+      <p:sp>
+        <p:nvSpPr>
+          <p:cNvPr id="6" name="Espace réservé du pied de page 5">
+            <a:extLst>
+              <a:ext uri="{FF2B5EF4-FFF2-40B4-BE49-F238E27FC236}">
+                <a16:creationId xmlns:a16="http://schemas.microsoft.com/office/drawing/2014/main" id="{940FC0D1-460C-5274-B67A-CADD301151E8}"/>
+              </a:ext>
+            </a:extLst>
+          </p:cNvPr>
+          <p:cNvSpPr>
+            <a:spLocks noGrp="1"/>
+          </p:cNvSpPr>
+          <p:nvPr>
+            <p:ph type="ftr" sz="quarter" idx="11"/>
+          </p:nvPr>
+        </p:nvSpPr>
+        <p:spPr/>
+        <p:txBody>
+          <a:bodyPr/>
+          <a:lstStyle/>
+          <a:p>
+            <a:endParaRPr lang="fr-BE"/>
+          </a:p>
+        </p:txBody>
+      </p:sp>
+      <p:sp>
+        <p:nvSpPr>
+          <p:cNvPr id="7" name="Espace réservé du numéro de diapositive 6">
+            <a:extLst>
+              <a:ext uri="{FF2B5EF4-FFF2-40B4-BE49-F238E27FC236}">
+                <a16:creationId xmlns:a16="http://schemas.microsoft.com/office/drawing/2014/main" id="{7D5E82B2-87DB-8B8E-12FD-843E81352499}"/>
+              </a:ext>
+            </a:extLst>
+          </p:cNvPr>
+          <p:cNvSpPr>
+            <a:spLocks noGrp="1"/>
+          </p:cNvSpPr>
+          <p:nvPr>
+            <p:ph type="sldNum" sz="quarter" idx="12"/>
+          </p:nvPr>
+        </p:nvSpPr>
+        <p:spPr/>
+        <p:txBody>
+          <a:bodyPr/>
+          <a:lstStyle/>
+          <a:p>
+            <a:fld id="{02C092ED-0E97-497E-99D9-BB9DD7276F53}" type="slidenum">
+              <a:rPr lang="fr-BE" smtClean="0"/>
+              <a:t>‹N°›</a:t>
+            </a:fld>
+            <a:endParaRPr lang="fr-BE"/>
+          </a:p>
+        </p:txBody>
+      </p:sp>
+    </p:spTree>
+    <p:extLst>
+      <p:ext uri="{BB962C8B-B14F-4D97-AF65-F5344CB8AC3E}">
+        <p14:creationId xmlns:p14="http://schemas.microsoft.com/office/powerpoint/2010/main" val="2508686580"/>
+      </p:ext>
+    </p:extLst>
+  </p:cSld>
+  <p:clrMapOvr>
+    <a:masterClrMapping/>
+  </p:clrMapOvr>
+  <mc:AlternateContent xmlns:mc="http://schemas.openxmlformats.org/markup-compatibility/2006" xmlns:p14="http://schemas.microsoft.com/office/powerpoint/2010/main">
+    <mc:Choice Requires="p14">
+      <p:transition spd="slow">
+        <p14:reveal/>
+      </p:transition>
+    </mc:Choice>
+    <mc:Fallback xmlns="">
+      <p:transition spd="slow">
+        <p:fade/>
+      </p:transition>
+    </mc:Fallback>
+  </mc:AlternateContent>
+  <p:hf hdr="0" ftr="0"/>
+</p:sldLayout>
+</file>
+
+<file path=ppt/slideLayouts/slideLayout6.xml><?xml version="1.0" encoding="utf-8"?>
 <p:sldLayout xmlns:a="http://schemas.openxmlformats.org/drawingml/2006/main" xmlns:r="http://schemas.openxmlformats.org/officeDocument/2006/relationships" xmlns:p="http://schemas.openxmlformats.org/presentationml/2006/main" type="twoTxTwoObj" preserve="1">
-  <p:cSld name="Comparison">
+  <p:cSld name="Comparaison">
     <p:spTree>
       <p:nvGrpSpPr>
         <p:cNvPr id="1" name=""/>
@@ -2197,8 +2973,8 @@
           <a:lstStyle/>
           <a:p>
             <a:r>
-              <a:rPr lang="en-US"/>
-              <a:t>Click to edit Master title style</a:t>
+              <a:rPr lang="fr-FR"/>
+              <a:t>Modifiez le style du titre</a:t>
             </a:r>
             <a:endParaRPr lang="fr-BE"/>
           </a:p>
@@ -2263,8 +3039,8 @@
           <a:p>
             <a:pPr lvl="0"/>
             <a:r>
-              <a:rPr lang="en-US"/>
-              <a:t>Edit Master text styles</a:t>
+              <a:rPr lang="fr-FR"/>
+              <a:t>Cliquez pour modifier les styles du texte du masque</a:t>
             </a:r>
           </a:p>
         </p:txBody>
@@ -2291,36 +3067,36 @@
           <a:p>
             <a:pPr lvl="0"/>
             <a:r>
-              <a:rPr lang="en-US"/>
-              <a:t>Edit Master text styles</a:t>
+              <a:rPr lang="fr-FR"/>
+              <a:t>Cliquez pour modifier les styles du texte du masque</a:t>
             </a:r>
           </a:p>
           <a:p>
             <a:pPr lvl="1"/>
             <a:r>
-              <a:rPr lang="en-US"/>
-              <a:t>Second level</a:t>
+              <a:rPr lang="fr-FR"/>
+              <a:t>Deuxième niveau</a:t>
             </a:r>
           </a:p>
           <a:p>
             <a:pPr lvl="2"/>
             <a:r>
-              <a:rPr lang="en-US"/>
-              <a:t>Third level</a:t>
+              <a:rPr lang="fr-FR"/>
+              <a:t>Troisième niveau</a:t>
             </a:r>
           </a:p>
           <a:p>
             <a:pPr lvl="3"/>
             <a:r>
-              <a:rPr lang="en-US"/>
-              <a:t>Fourth level</a:t>
+              <a:rPr lang="fr-FR"/>
+              <a:t>Quatrième niveau</a:t>
             </a:r>
           </a:p>
           <a:p>
             <a:pPr lvl="4"/>
             <a:r>
-              <a:rPr lang="en-US"/>
-              <a:t>Fifth level</a:t>
+              <a:rPr lang="fr-FR"/>
+              <a:t>Cinquième niveau</a:t>
             </a:r>
             <a:endParaRPr lang="fr-BE"/>
           </a:p>
@@ -2385,8 +3161,8 @@
           <a:p>
             <a:pPr lvl="0"/>
             <a:r>
-              <a:rPr lang="en-US"/>
-              <a:t>Edit Master text styles</a:t>
+              <a:rPr lang="fr-FR"/>
+              <a:t>Cliquez pour modifier les styles du texte du masque</a:t>
             </a:r>
           </a:p>
         </p:txBody>
@@ -2413,37 +3189,120 @@
           <a:p>
             <a:pPr lvl="0"/>
             <a:r>
-              <a:rPr lang="en-US"/>
-              <a:t>Edit Master text styles</a:t>
+              <a:rPr lang="fr-FR"/>
+              <a:t>Cliquez pour modifier les styles du texte du masque</a:t>
             </a:r>
           </a:p>
           <a:p>
             <a:pPr lvl="1"/>
             <a:r>
-              <a:rPr lang="en-US"/>
-              <a:t>Second level</a:t>
+              <a:rPr lang="fr-FR"/>
+              <a:t>Deuxième niveau</a:t>
             </a:r>
           </a:p>
           <a:p>
             <a:pPr lvl="2"/>
             <a:r>
-              <a:rPr lang="en-US"/>
-              <a:t>Third level</a:t>
+              <a:rPr lang="fr-FR"/>
+              <a:t>Troisième niveau</a:t>
             </a:r>
           </a:p>
           <a:p>
             <a:pPr lvl="3"/>
             <a:r>
-              <a:rPr lang="en-US"/>
-              <a:t>Fourth level</a:t>
+              <a:rPr lang="fr-FR"/>
+              <a:t>Quatrième niveau</a:t>
             </a:r>
           </a:p>
           <a:p>
             <a:pPr lvl="4"/>
             <a:r>
-              <a:rPr lang="en-US"/>
-              <a:t>Fifth level</a:t>
-            </a:r>
+              <a:rPr lang="fr-FR"/>
+              <a:t>Cinquième niveau</a:t>
+            </a:r>
+            <a:endParaRPr lang="fr-BE"/>
+          </a:p>
+        </p:txBody>
+      </p:sp>
+      <p:sp>
+        <p:nvSpPr>
+          <p:cNvPr id="7" name="Espace réservé de la date 6">
+            <a:extLst>
+              <a:ext uri="{FF2B5EF4-FFF2-40B4-BE49-F238E27FC236}">
+                <a16:creationId xmlns:a16="http://schemas.microsoft.com/office/drawing/2014/main" id="{D605DBAD-E815-DA9F-C843-1DE122AA5FFF}"/>
+              </a:ext>
+            </a:extLst>
+          </p:cNvPr>
+          <p:cNvSpPr>
+            <a:spLocks noGrp="1"/>
+          </p:cNvSpPr>
+          <p:nvPr>
+            <p:ph type="dt" sz="half" idx="10"/>
+          </p:nvPr>
+        </p:nvSpPr>
+        <p:spPr/>
+        <p:txBody>
+          <a:bodyPr/>
+          <a:lstStyle/>
+          <a:p>
+            <a:fld id="{F3953782-D06E-4853-BE3C-64C197273937}" type="datetimeFigureOut">
+              <a:rPr lang="fr-BE" smtClean="0"/>
+              <a:t>14-01-25</a:t>
+            </a:fld>
+            <a:endParaRPr lang="fr-BE"/>
+          </a:p>
+        </p:txBody>
+      </p:sp>
+      <p:sp>
+        <p:nvSpPr>
+          <p:cNvPr id="8" name="Espace réservé du pied de page 7">
+            <a:extLst>
+              <a:ext uri="{FF2B5EF4-FFF2-40B4-BE49-F238E27FC236}">
+                <a16:creationId xmlns:a16="http://schemas.microsoft.com/office/drawing/2014/main" id="{F344211E-58E3-3B61-D18C-DCC7772A096B}"/>
+              </a:ext>
+            </a:extLst>
+          </p:cNvPr>
+          <p:cNvSpPr>
+            <a:spLocks noGrp="1"/>
+          </p:cNvSpPr>
+          <p:nvPr>
+            <p:ph type="ftr" sz="quarter" idx="11"/>
+          </p:nvPr>
+        </p:nvSpPr>
+        <p:spPr/>
+        <p:txBody>
+          <a:bodyPr/>
+          <a:lstStyle/>
+          <a:p>
+            <a:endParaRPr lang="fr-BE"/>
+          </a:p>
+        </p:txBody>
+      </p:sp>
+      <p:sp>
+        <p:nvSpPr>
+          <p:cNvPr id="9" name="Espace réservé du numéro de diapositive 8">
+            <a:extLst>
+              <a:ext uri="{FF2B5EF4-FFF2-40B4-BE49-F238E27FC236}">
+                <a16:creationId xmlns:a16="http://schemas.microsoft.com/office/drawing/2014/main" id="{85F2F6A2-3605-D138-CBD4-299C105E107C}"/>
+              </a:ext>
+            </a:extLst>
+          </p:cNvPr>
+          <p:cNvSpPr>
+            <a:spLocks noGrp="1"/>
+          </p:cNvSpPr>
+          <p:nvPr>
+            <p:ph type="sldNum" sz="quarter" idx="12"/>
+          </p:nvPr>
+        </p:nvSpPr>
+        <p:spPr/>
+        <p:txBody>
+          <a:bodyPr/>
+          <a:lstStyle/>
+          <a:p>
+            <a:fld id="{02C092ED-0E97-497E-99D9-BB9DD7276F53}" type="slidenum">
+              <a:rPr lang="fr-BE" smtClean="0"/>
+              <a:t>‹N°›</a:t>
+            </a:fld>
             <a:endParaRPr lang="fr-BE"/>
           </a:p>
         </p:txBody>
@@ -2451,7 +3310,7 @@
     </p:spTree>
     <p:extLst>
       <p:ext uri="{BB962C8B-B14F-4D97-AF65-F5344CB8AC3E}">
-        <p14:creationId xmlns:p14="http://schemas.microsoft.com/office/powerpoint/2010/main" val="732305386"/>
+        <p14:creationId xmlns:p14="http://schemas.microsoft.com/office/powerpoint/2010/main" val="803297488"/>
       </p:ext>
     </p:extLst>
   </p:cSld>
@@ -2470,12 +3329,13 @@
       </p:transition>
     </mc:Fallback>
   </mc:AlternateContent>
+  <p:hf hdr="0" ftr="0"/>
 </p:sldLayout>
 </file>
 
-<file path=ppt/slideLayouts/slideLayout6.xml><?xml version="1.0" encoding="utf-8"?>
+<file path=ppt/slideLayouts/slideLayout7.xml><?xml version="1.0" encoding="utf-8"?>
 <p:sldLayout xmlns:a="http://schemas.openxmlformats.org/drawingml/2006/main" xmlns:r="http://schemas.openxmlformats.org/officeDocument/2006/relationships" xmlns:p="http://schemas.openxmlformats.org/presentationml/2006/main" type="titleOnly" preserve="1">
-  <p:cSld name="Title Only">
+  <p:cSld name="Titre seul">
     <p:spTree>
       <p:nvGrpSpPr>
         <p:cNvPr id="1" name=""/>
@@ -2506,9 +3366,92 @@
           <a:lstStyle/>
           <a:p>
             <a:r>
-              <a:rPr lang="en-US"/>
-              <a:t>Click to edit Master title style</a:t>
-            </a:r>
+              <a:rPr lang="fr-FR"/>
+              <a:t>Modifiez le style du titre</a:t>
+            </a:r>
+            <a:endParaRPr lang="fr-BE"/>
+          </a:p>
+        </p:txBody>
+      </p:sp>
+      <p:sp>
+        <p:nvSpPr>
+          <p:cNvPr id="3" name="Espace réservé de la date 2">
+            <a:extLst>
+              <a:ext uri="{FF2B5EF4-FFF2-40B4-BE49-F238E27FC236}">
+                <a16:creationId xmlns:a16="http://schemas.microsoft.com/office/drawing/2014/main" id="{BB23E5C8-1D92-E25A-D482-9866759B5BD2}"/>
+              </a:ext>
+            </a:extLst>
+          </p:cNvPr>
+          <p:cNvSpPr>
+            <a:spLocks noGrp="1"/>
+          </p:cNvSpPr>
+          <p:nvPr>
+            <p:ph type="dt" sz="half" idx="10"/>
+          </p:nvPr>
+        </p:nvSpPr>
+        <p:spPr/>
+        <p:txBody>
+          <a:bodyPr/>
+          <a:lstStyle/>
+          <a:p>
+            <a:fld id="{F3953782-D06E-4853-BE3C-64C197273937}" type="datetimeFigureOut">
+              <a:rPr lang="fr-BE" smtClean="0"/>
+              <a:t>14-01-25</a:t>
+            </a:fld>
+            <a:endParaRPr lang="fr-BE"/>
+          </a:p>
+        </p:txBody>
+      </p:sp>
+      <p:sp>
+        <p:nvSpPr>
+          <p:cNvPr id="4" name="Espace réservé du pied de page 3">
+            <a:extLst>
+              <a:ext uri="{FF2B5EF4-FFF2-40B4-BE49-F238E27FC236}">
+                <a16:creationId xmlns:a16="http://schemas.microsoft.com/office/drawing/2014/main" id="{55ACAADE-10AC-A5C6-B021-C668BC2068AC}"/>
+              </a:ext>
+            </a:extLst>
+          </p:cNvPr>
+          <p:cNvSpPr>
+            <a:spLocks noGrp="1"/>
+          </p:cNvSpPr>
+          <p:nvPr>
+            <p:ph type="ftr" sz="quarter" idx="11"/>
+          </p:nvPr>
+        </p:nvSpPr>
+        <p:spPr/>
+        <p:txBody>
+          <a:bodyPr/>
+          <a:lstStyle/>
+          <a:p>
+            <a:endParaRPr lang="fr-BE"/>
+          </a:p>
+        </p:txBody>
+      </p:sp>
+      <p:sp>
+        <p:nvSpPr>
+          <p:cNvPr id="5" name="Espace réservé du numéro de diapositive 4">
+            <a:extLst>
+              <a:ext uri="{FF2B5EF4-FFF2-40B4-BE49-F238E27FC236}">
+                <a16:creationId xmlns:a16="http://schemas.microsoft.com/office/drawing/2014/main" id="{64BD460E-C94D-0F17-7C77-D32F9CC12D7A}"/>
+              </a:ext>
+            </a:extLst>
+          </p:cNvPr>
+          <p:cNvSpPr>
+            <a:spLocks noGrp="1"/>
+          </p:cNvSpPr>
+          <p:nvPr>
+            <p:ph type="sldNum" sz="quarter" idx="12"/>
+          </p:nvPr>
+        </p:nvSpPr>
+        <p:spPr/>
+        <p:txBody>
+          <a:bodyPr/>
+          <a:lstStyle/>
+          <a:p>
+            <a:fld id="{02C092ED-0E97-497E-99D9-BB9DD7276F53}" type="slidenum">
+              <a:rPr lang="fr-BE" smtClean="0"/>
+              <a:t>‹N°›</a:t>
+            </a:fld>
             <a:endParaRPr lang="fr-BE"/>
           </a:p>
         </p:txBody>
@@ -2516,7 +3459,7 @@
     </p:spTree>
     <p:extLst>
       <p:ext uri="{BB962C8B-B14F-4D97-AF65-F5344CB8AC3E}">
-        <p14:creationId xmlns:p14="http://schemas.microsoft.com/office/powerpoint/2010/main" val="1351765376"/>
+        <p14:creationId xmlns:p14="http://schemas.microsoft.com/office/powerpoint/2010/main" val="3766622985"/>
       </p:ext>
     </p:extLst>
   </p:cSld>
@@ -2535,12 +3478,13 @@
       </p:transition>
     </mc:Fallback>
   </mc:AlternateContent>
+  <p:hf hdr="0" ftr="0"/>
 </p:sldLayout>
 </file>
 
-<file path=ppt/slideLayouts/slideLayout7.xml><?xml version="1.0" encoding="utf-8"?>
+<file path=ppt/slideLayouts/slideLayout8.xml><?xml version="1.0" encoding="utf-8"?>
 <p:sldLayout xmlns:a="http://schemas.openxmlformats.org/drawingml/2006/main" xmlns:r="http://schemas.openxmlformats.org/officeDocument/2006/relationships" xmlns:p="http://schemas.openxmlformats.org/presentationml/2006/main" type="blank" preserve="1">
-  <p:cSld name="Blank">
+  <p:cSld name="Vide">
     <p:spTree>
       <p:nvGrpSpPr>
         <p:cNvPr id="1" name=""/>
@@ -2558,7 +3502,7 @@
     </p:spTree>
     <p:extLst>
       <p:ext uri="{BB962C8B-B14F-4D97-AF65-F5344CB8AC3E}">
-        <p14:creationId xmlns:p14="http://schemas.microsoft.com/office/powerpoint/2010/main" val="3931488030"/>
+        <p14:creationId xmlns:p14="http://schemas.microsoft.com/office/powerpoint/2010/main" val="1009843628"/>
       </p:ext>
     </p:extLst>
   </p:cSld>
@@ -2577,12 +3521,13 @@
       </p:transition>
     </mc:Fallback>
   </mc:AlternateContent>
+  <p:hf hdr="0" ftr="0"/>
 </p:sldLayout>
 </file>
 
-<file path=ppt/slideLayouts/slideLayout8.xml><?xml version="1.0" encoding="utf-8"?>
+<file path=ppt/slideLayouts/slideLayout9.xml><?xml version="1.0" encoding="utf-8"?>
 <p:sldLayout xmlns:a="http://schemas.openxmlformats.org/drawingml/2006/main" xmlns:r="http://schemas.openxmlformats.org/officeDocument/2006/relationships" xmlns:p="http://schemas.openxmlformats.org/presentationml/2006/main" type="objTx" preserve="1">
-  <p:cSld name="Content with Caption">
+  <p:cSld name="Contenu avec légende">
     <p:spTree>
       <p:nvGrpSpPr>
         <p:cNvPr id="1" name=""/>
@@ -2622,8 +3567,8 @@
           </a:lstStyle>
           <a:p>
             <a:r>
-              <a:rPr lang="en-US"/>
-              <a:t>Click to edit Master title style</a:t>
+              <a:rPr lang="fr-FR"/>
+              <a:t>Modifiez le style du titre</a:t>
             </a:r>
             <a:endParaRPr lang="fr-BE"/>
           </a:p>
@@ -2641,8 +3586,8 @@
         </p:nvSpPr>
         <p:spPr>
           <a:xfrm>
-            <a:off x="5183188" y="987426"/>
-            <a:ext cx="6172200" cy="4873625"/>
+            <a:off x="5183188" y="457200"/>
+            <a:ext cx="6172200" cy="5403851"/>
           </a:xfrm>
         </p:spPr>
         <p:txBody>
@@ -2679,38 +3624,38 @@
           <a:p>
             <a:pPr lvl="0"/>
             <a:r>
-              <a:rPr lang="en-US"/>
-              <a:t>Edit Master text styles</a:t>
+              <a:rPr lang="fr-FR"/>
+              <a:t>Cliquez pour modifier les styles du texte du masque</a:t>
             </a:r>
           </a:p>
           <a:p>
             <a:pPr lvl="1"/>
             <a:r>
-              <a:rPr lang="en-US"/>
-              <a:t>Second level</a:t>
+              <a:rPr lang="fr-FR"/>
+              <a:t>Deuxième niveau</a:t>
             </a:r>
           </a:p>
           <a:p>
             <a:pPr lvl="2"/>
             <a:r>
-              <a:rPr lang="en-US"/>
-              <a:t>Third level</a:t>
+              <a:rPr lang="fr-FR"/>
+              <a:t>Troisième niveau</a:t>
             </a:r>
           </a:p>
           <a:p>
             <a:pPr lvl="3"/>
             <a:r>
-              <a:rPr lang="en-US"/>
-              <a:t>Fourth level</a:t>
+              <a:rPr lang="fr-FR"/>
+              <a:t>Quatrième niveau</a:t>
             </a:r>
           </a:p>
           <a:p>
             <a:pPr lvl="4"/>
             <a:r>
-              <a:rPr lang="en-US"/>
-              <a:t>Fifth level</a:t>
-            </a:r>
-            <a:endParaRPr lang="fr-BE"/>
+              <a:rPr lang="fr-FR"/>
+              <a:t>Cinquième niveau</a:t>
+            </a:r>
+            <a:endParaRPr lang="fr-BE" dirty="0"/>
           </a:p>
         </p:txBody>
       </p:sp>
@@ -2773,16 +3718,99 @@
           <a:p>
             <a:pPr lvl="0"/>
             <a:r>
-              <a:rPr lang="en-US"/>
-              <a:t>Edit Master text styles</a:t>
-            </a:r>
+              <a:rPr lang="fr-FR"/>
+              <a:t>Cliquez pour modifier les styles du texte du masque</a:t>
+            </a:r>
+          </a:p>
+        </p:txBody>
+      </p:sp>
+      <p:sp>
+        <p:nvSpPr>
+          <p:cNvPr id="5" name="Espace réservé de la date 4">
+            <a:extLst>
+              <a:ext uri="{FF2B5EF4-FFF2-40B4-BE49-F238E27FC236}">
+                <a16:creationId xmlns:a16="http://schemas.microsoft.com/office/drawing/2014/main" id="{433BACDB-1022-3581-CB46-1F85D70253ED}"/>
+              </a:ext>
+            </a:extLst>
+          </p:cNvPr>
+          <p:cNvSpPr>
+            <a:spLocks noGrp="1"/>
+          </p:cNvSpPr>
+          <p:nvPr>
+            <p:ph type="dt" sz="half" idx="10"/>
+          </p:nvPr>
+        </p:nvSpPr>
+        <p:spPr/>
+        <p:txBody>
+          <a:bodyPr/>
+          <a:lstStyle/>
+          <a:p>
+            <a:fld id="{F3953782-D06E-4853-BE3C-64C197273937}" type="datetimeFigureOut">
+              <a:rPr lang="fr-BE" smtClean="0"/>
+              <a:t>14-01-25</a:t>
+            </a:fld>
+            <a:endParaRPr lang="fr-BE"/>
+          </a:p>
+        </p:txBody>
+      </p:sp>
+      <p:sp>
+        <p:nvSpPr>
+          <p:cNvPr id="6" name="Espace réservé du pied de page 5">
+            <a:extLst>
+              <a:ext uri="{FF2B5EF4-FFF2-40B4-BE49-F238E27FC236}">
+                <a16:creationId xmlns:a16="http://schemas.microsoft.com/office/drawing/2014/main" id="{9C8F4609-0312-F825-CC91-FAC10F330180}"/>
+              </a:ext>
+            </a:extLst>
+          </p:cNvPr>
+          <p:cNvSpPr>
+            <a:spLocks noGrp="1"/>
+          </p:cNvSpPr>
+          <p:nvPr>
+            <p:ph type="ftr" sz="quarter" idx="11"/>
+          </p:nvPr>
+        </p:nvSpPr>
+        <p:spPr/>
+        <p:txBody>
+          <a:bodyPr/>
+          <a:lstStyle/>
+          <a:p>
+            <a:endParaRPr lang="fr-BE"/>
+          </a:p>
+        </p:txBody>
+      </p:sp>
+      <p:sp>
+        <p:nvSpPr>
+          <p:cNvPr id="7" name="Espace réservé du numéro de diapositive 6">
+            <a:extLst>
+              <a:ext uri="{FF2B5EF4-FFF2-40B4-BE49-F238E27FC236}">
+                <a16:creationId xmlns:a16="http://schemas.microsoft.com/office/drawing/2014/main" id="{91F0E555-3A77-670E-9C69-DE1D8DE232F9}"/>
+              </a:ext>
+            </a:extLst>
+          </p:cNvPr>
+          <p:cNvSpPr>
+            <a:spLocks noGrp="1"/>
+          </p:cNvSpPr>
+          <p:nvPr>
+            <p:ph type="sldNum" sz="quarter" idx="12"/>
+          </p:nvPr>
+        </p:nvSpPr>
+        <p:spPr/>
+        <p:txBody>
+          <a:bodyPr/>
+          <a:lstStyle/>
+          <a:p>
+            <a:fld id="{02C092ED-0E97-497E-99D9-BB9DD7276F53}" type="slidenum">
+              <a:rPr lang="fr-BE" smtClean="0"/>
+              <a:t>‹N°›</a:t>
+            </a:fld>
+            <a:endParaRPr lang="fr-BE"/>
           </a:p>
         </p:txBody>
       </p:sp>
     </p:spTree>
     <p:extLst>
       <p:ext uri="{BB962C8B-B14F-4D97-AF65-F5344CB8AC3E}">
-        <p14:creationId xmlns:p14="http://schemas.microsoft.com/office/powerpoint/2010/main" val="3017668453"/>
+        <p14:creationId xmlns:p14="http://schemas.microsoft.com/office/powerpoint/2010/main" val="3505290387"/>
       </p:ext>
     </p:extLst>
   </p:cSld>
@@ -2801,210 +3829,7 @@
       </p:transition>
     </mc:Fallback>
   </mc:AlternateContent>
-</p:sldLayout>
-</file>
-
-<file path=ppt/slideLayouts/slideLayout9.xml><?xml version="1.0" encoding="utf-8"?>
-<p:sldLayout xmlns:a="http://schemas.openxmlformats.org/drawingml/2006/main" xmlns:r="http://schemas.openxmlformats.org/officeDocument/2006/relationships" xmlns:p="http://schemas.openxmlformats.org/presentationml/2006/main" type="picTx" preserve="1">
-  <p:cSld name="Picture with Caption">
-    <p:spTree>
-      <p:nvGrpSpPr>
-        <p:cNvPr id="1" name=""/>
-        <p:cNvGrpSpPr/>
-        <p:nvPr/>
-      </p:nvGrpSpPr>
-      <p:grpSpPr>
-        <a:xfrm>
-          <a:off x="0" y="0"/>
-          <a:ext cx="0" cy="0"/>
-          <a:chOff x="0" y="0"/>
-          <a:chExt cx="0" cy="0"/>
-        </a:xfrm>
-      </p:grpSpPr>
-      <p:sp>
-        <p:nvSpPr>
-          <p:cNvPr id="2" name="Title 1"/>
-          <p:cNvSpPr>
-            <a:spLocks noGrp="1"/>
-          </p:cNvSpPr>
-          <p:nvPr>
-            <p:ph type="title"/>
-          </p:nvPr>
-        </p:nvSpPr>
-        <p:spPr>
-          <a:xfrm>
-            <a:off x="839788" y="457200"/>
-            <a:ext cx="3932237" cy="1600200"/>
-          </a:xfrm>
-        </p:spPr>
-        <p:txBody>
-          <a:bodyPr anchor="b"/>
-          <a:lstStyle>
-            <a:lvl1pPr>
-              <a:defRPr sz="3200"/>
-            </a:lvl1pPr>
-          </a:lstStyle>
-          <a:p>
-            <a:r>
-              <a:rPr lang="en-US"/>
-              <a:t>Click to edit Master title style</a:t>
-            </a:r>
-            <a:endParaRPr lang="fr-BE"/>
-          </a:p>
-        </p:txBody>
-      </p:sp>
-      <p:sp>
-        <p:nvSpPr>
-          <p:cNvPr id="3" name="Picture Placeholder 2"/>
-          <p:cNvSpPr>
-            <a:spLocks noGrp="1"/>
-          </p:cNvSpPr>
-          <p:nvPr>
-            <p:ph type="pic" idx="1"/>
-          </p:nvPr>
-        </p:nvSpPr>
-        <p:spPr>
-          <a:xfrm>
-            <a:off x="5183188" y="987426"/>
-            <a:ext cx="6172200" cy="4873625"/>
-          </a:xfrm>
-        </p:spPr>
-        <p:txBody>
-          <a:bodyPr/>
-          <a:lstStyle>
-            <a:lvl1pPr marL="0" indent="0">
-              <a:buNone/>
-              <a:defRPr sz="3200"/>
-            </a:lvl1pPr>
-            <a:lvl2pPr marL="457189" indent="0">
-              <a:buNone/>
-              <a:defRPr sz="2800"/>
-            </a:lvl2pPr>
-            <a:lvl3pPr marL="914377" indent="0">
-              <a:buNone/>
-              <a:defRPr sz="2400"/>
-            </a:lvl3pPr>
-            <a:lvl4pPr marL="1371566" indent="0">
-              <a:buNone/>
-              <a:defRPr sz="2000"/>
-            </a:lvl4pPr>
-            <a:lvl5pPr marL="1828754" indent="0">
-              <a:buNone/>
-              <a:defRPr sz="2000"/>
-            </a:lvl5pPr>
-            <a:lvl6pPr marL="2285943" indent="0">
-              <a:buNone/>
-              <a:defRPr sz="2000"/>
-            </a:lvl6pPr>
-            <a:lvl7pPr marL="2743131" indent="0">
-              <a:buNone/>
-              <a:defRPr sz="2000"/>
-            </a:lvl7pPr>
-            <a:lvl8pPr marL="3200320" indent="0">
-              <a:buNone/>
-              <a:defRPr sz="2000"/>
-            </a:lvl8pPr>
-            <a:lvl9pPr marL="3657509" indent="0">
-              <a:buNone/>
-              <a:defRPr sz="2000"/>
-            </a:lvl9pPr>
-          </a:lstStyle>
-          <a:p>
-            <a:r>
-              <a:rPr lang="en-US"/>
-              <a:t>Click icon to add picture</a:t>
-            </a:r>
-            <a:endParaRPr lang="fr-BE"/>
-          </a:p>
-        </p:txBody>
-      </p:sp>
-      <p:sp>
-        <p:nvSpPr>
-          <p:cNvPr id="4" name="Text Placeholder 3"/>
-          <p:cNvSpPr>
-            <a:spLocks noGrp="1"/>
-          </p:cNvSpPr>
-          <p:nvPr>
-            <p:ph type="body" sz="half" idx="2"/>
-          </p:nvPr>
-        </p:nvSpPr>
-        <p:spPr>
-          <a:xfrm>
-            <a:off x="839788" y="2057401"/>
-            <a:ext cx="3932237" cy="3811588"/>
-          </a:xfrm>
-        </p:spPr>
-        <p:txBody>
-          <a:bodyPr/>
-          <a:lstStyle>
-            <a:lvl1pPr marL="0" indent="0">
-              <a:buNone/>
-              <a:defRPr sz="1600"/>
-            </a:lvl1pPr>
-            <a:lvl2pPr marL="457189" indent="0">
-              <a:buNone/>
-              <a:defRPr sz="1400"/>
-            </a:lvl2pPr>
-            <a:lvl3pPr marL="914377" indent="0">
-              <a:buNone/>
-              <a:defRPr sz="1200"/>
-            </a:lvl3pPr>
-            <a:lvl4pPr marL="1371566" indent="0">
-              <a:buNone/>
-              <a:defRPr sz="1000"/>
-            </a:lvl4pPr>
-            <a:lvl5pPr marL="1828754" indent="0">
-              <a:buNone/>
-              <a:defRPr sz="1000"/>
-            </a:lvl5pPr>
-            <a:lvl6pPr marL="2285943" indent="0">
-              <a:buNone/>
-              <a:defRPr sz="1000"/>
-            </a:lvl6pPr>
-            <a:lvl7pPr marL="2743131" indent="0">
-              <a:buNone/>
-              <a:defRPr sz="1000"/>
-            </a:lvl7pPr>
-            <a:lvl8pPr marL="3200320" indent="0">
-              <a:buNone/>
-              <a:defRPr sz="1000"/>
-            </a:lvl8pPr>
-            <a:lvl9pPr marL="3657509" indent="0">
-              <a:buNone/>
-              <a:defRPr sz="1000"/>
-            </a:lvl9pPr>
-          </a:lstStyle>
-          <a:p>
-            <a:pPr lvl="0"/>
-            <a:r>
-              <a:rPr lang="en-US"/>
-              <a:t>Edit Master text styles</a:t>
-            </a:r>
-          </a:p>
-        </p:txBody>
-      </p:sp>
-    </p:spTree>
-    <p:extLst>
-      <p:ext uri="{BB962C8B-B14F-4D97-AF65-F5344CB8AC3E}">
-        <p14:creationId xmlns:p14="http://schemas.microsoft.com/office/powerpoint/2010/main" val="752602339"/>
-      </p:ext>
-    </p:extLst>
-  </p:cSld>
-  <p:clrMapOvr>
-    <a:masterClrMapping/>
-  </p:clrMapOvr>
-  <mc:AlternateContent xmlns:mc="http://schemas.openxmlformats.org/markup-compatibility/2006" xmlns:p14="http://schemas.microsoft.com/office/powerpoint/2010/main">
-    <mc:Choice Requires="p14">
-      <p:transition spd="slow">
-        <p14:reveal/>
-      </p:transition>
-    </mc:Choice>
-    <mc:Fallback xmlns="">
-      <p:transition spd="slow">
-        <p:fade/>
-      </p:transition>
-    </mc:Fallback>
-  </mc:AlternateContent>
+  <p:hf hdr="0" ftr="0"/>
 </p:sldLayout>
 </file>
 
@@ -3014,7 +3839,10 @@
     <p:bg>
       <p:bgPr>
         <a:solidFill>
-          <a:schemeClr val="accent6"/>
+          <a:schemeClr val="accent3">
+            <a:lumMod val="40000"/>
+            <a:lumOff val="60000"/>
+          </a:schemeClr>
         </a:solidFill>
         <a:effectLst/>
       </p:bgPr>
@@ -3059,8 +3887,8 @@
           <a:lstStyle/>
           <a:p>
             <a:r>
-              <a:rPr lang="en-US"/>
-              <a:t>Click to edit Master title style</a:t>
+              <a:rPr lang="fr-FR"/>
+              <a:t>Modifiez le style du titre</a:t>
             </a:r>
             <a:endParaRPr lang="fr-BE"/>
           </a:p>
@@ -3093,36 +3921,36 @@
           <a:p>
             <a:pPr lvl="0"/>
             <a:r>
-              <a:rPr lang="en-US"/>
-              <a:t>Edit Master text styles</a:t>
+              <a:rPr lang="fr-FR"/>
+              <a:t>Cliquez pour modifier les styles du texte du masque</a:t>
             </a:r>
           </a:p>
           <a:p>
             <a:pPr lvl="1"/>
             <a:r>
-              <a:rPr lang="en-US"/>
-              <a:t>Second level</a:t>
+              <a:rPr lang="fr-FR"/>
+              <a:t>Deuxième niveau</a:t>
             </a:r>
           </a:p>
           <a:p>
             <a:pPr lvl="2"/>
             <a:r>
-              <a:rPr lang="en-US"/>
-              <a:t>Third level</a:t>
+              <a:rPr lang="fr-FR"/>
+              <a:t>Troisième niveau</a:t>
             </a:r>
           </a:p>
           <a:p>
             <a:pPr lvl="3"/>
             <a:r>
-              <a:rPr lang="en-US"/>
-              <a:t>Fourth level</a:t>
+              <a:rPr lang="fr-FR"/>
+              <a:t>Quatrième niveau</a:t>
             </a:r>
           </a:p>
           <a:p>
             <a:pPr lvl="4"/>
             <a:r>
-              <a:rPr lang="en-US"/>
-              <a:t>Fifth level</a:t>
+              <a:rPr lang="fr-FR"/>
+              <a:t>Cinquième niveau</a:t>
             </a:r>
             <a:endParaRPr lang="fr-BE"/>
           </a:p>
@@ -3134,10 +3962,183 @@
           <p:cNvPicPr>
             <a:picLocks noChangeAspect="1"/>
           </p:cNvPicPr>
+          <p:nvPr/>
+        </p:nvPicPr>
+        <p:blipFill>
+          <a:blip r:embed="rId12">
+            <a:extLst>
+              <a:ext uri="{28A0092B-C50C-407E-A947-70E740481C1C}">
+                <a14:useLocalDpi xmlns:a14="http://schemas.microsoft.com/office/drawing/2010/main" val="0"/>
+              </a:ext>
+            </a:extLst>
+          </a:blip>
+          <a:stretch>
+            <a:fillRect/>
+          </a:stretch>
+        </p:blipFill>
+        <p:spPr>
+          <a:xfrm>
+            <a:off x="10830515" y="5719725"/>
+            <a:ext cx="1046571" cy="914479"/>
+          </a:xfrm>
+          <a:prstGeom prst="rect">
+            <a:avLst/>
+          </a:prstGeom>
+        </p:spPr>
+      </p:pic>
+      <p:sp>
+        <p:nvSpPr>
+          <p:cNvPr id="4" name="Espace réservé du numéro de diapositive 3">
+            <a:extLst>
+              <a:ext uri="{FF2B5EF4-FFF2-40B4-BE49-F238E27FC236}">
+                <a16:creationId xmlns:a16="http://schemas.microsoft.com/office/drawing/2014/main" id="{FD73148E-CCCA-4F1F-A836-655D884BBFFF}"/>
+              </a:ext>
+            </a:extLst>
+          </p:cNvPr>
+          <p:cNvSpPr>
+            <a:spLocks noGrp="1"/>
+          </p:cNvSpPr>
+          <p:nvPr>
+            <p:ph type="sldNum" sz="quarter" idx="4"/>
+          </p:nvPr>
+        </p:nvSpPr>
+        <p:spPr>
+          <a:xfrm>
+            <a:off x="8610600" y="6359526"/>
+            <a:ext cx="2743200" cy="365125"/>
+          </a:xfrm>
+          <a:prstGeom prst="rect">
+            <a:avLst/>
+          </a:prstGeom>
+        </p:spPr>
+        <p:txBody>
+          <a:bodyPr vert="horz" lIns="91440" tIns="45720" rIns="91440" bIns="45720" rtlCol="0" anchor="ctr"/>
+          <a:lstStyle>
+            <a:lvl1pPr algn="r">
+              <a:defRPr sz="1200">
+                <a:solidFill>
+                  <a:schemeClr val="tx1">
+                    <a:tint val="75000"/>
+                  </a:schemeClr>
+                </a:solidFill>
+              </a:defRPr>
+            </a:lvl1pPr>
+          </a:lstStyle>
+          <a:p>
+            <a:fld id="{02C092ED-0E97-497E-99D9-BB9DD7276F53}" type="slidenum">
+              <a:rPr lang="fr-BE" smtClean="0"/>
+              <a:t>‹N°›</a:t>
+            </a:fld>
+            <a:endParaRPr lang="fr-BE"/>
+          </a:p>
+        </p:txBody>
+      </p:sp>
+      <p:sp>
+        <p:nvSpPr>
+          <p:cNvPr id="5" name="Espace réservé de la date 4">
+            <a:extLst>
+              <a:ext uri="{FF2B5EF4-FFF2-40B4-BE49-F238E27FC236}">
+                <a16:creationId xmlns:a16="http://schemas.microsoft.com/office/drawing/2014/main" id="{7E29B381-A1A5-FC30-27CA-947A2690386C}"/>
+              </a:ext>
+            </a:extLst>
+          </p:cNvPr>
+          <p:cNvSpPr>
+            <a:spLocks noGrp="1"/>
+          </p:cNvSpPr>
+          <p:nvPr>
+            <p:ph type="dt" sz="half" idx="2"/>
+          </p:nvPr>
+        </p:nvSpPr>
+        <p:spPr>
+          <a:xfrm>
+            <a:off x="838200" y="6356350"/>
+            <a:ext cx="2743200" cy="365125"/>
+          </a:xfrm>
+          <a:prstGeom prst="rect">
+            <a:avLst/>
+          </a:prstGeom>
+        </p:spPr>
+        <p:txBody>
+          <a:bodyPr vert="horz" lIns="91440" tIns="45720" rIns="91440" bIns="45720" rtlCol="0" anchor="ctr"/>
+          <a:lstStyle>
+            <a:lvl1pPr algn="l">
+              <a:defRPr sz="1200">
+                <a:solidFill>
+                  <a:schemeClr val="tx1">
+                    <a:tint val="75000"/>
+                  </a:schemeClr>
+                </a:solidFill>
+              </a:defRPr>
+            </a:lvl1pPr>
+          </a:lstStyle>
+          <a:p>
+            <a:fld id="{F3953782-D06E-4853-BE3C-64C197273937}" type="datetimeFigureOut">
+              <a:rPr lang="fr-BE" smtClean="0"/>
+              <a:t>14-01-25</a:t>
+            </a:fld>
+            <a:endParaRPr lang="fr-BE"/>
+          </a:p>
+        </p:txBody>
+      </p:sp>
+      <p:sp>
+        <p:nvSpPr>
+          <p:cNvPr id="6" name="Espace réservé du pied de page 5">
+            <a:extLst>
+              <a:ext uri="{FF2B5EF4-FFF2-40B4-BE49-F238E27FC236}">
+                <a16:creationId xmlns:a16="http://schemas.microsoft.com/office/drawing/2014/main" id="{7BFB2116-0A00-B6AB-43FF-F23B8EB09A31}"/>
+              </a:ext>
+            </a:extLst>
+          </p:cNvPr>
+          <p:cNvSpPr>
+            <a:spLocks noGrp="1"/>
+          </p:cNvSpPr>
+          <p:nvPr>
+            <p:ph type="ftr" sz="quarter" idx="3"/>
+          </p:nvPr>
+        </p:nvSpPr>
+        <p:spPr>
+          <a:xfrm>
+            <a:off x="4038600" y="6356350"/>
+            <a:ext cx="4114800" cy="365125"/>
+          </a:xfrm>
+          <a:prstGeom prst="rect">
+            <a:avLst/>
+          </a:prstGeom>
+        </p:spPr>
+        <p:txBody>
+          <a:bodyPr vert="horz" lIns="91440" tIns="45720" rIns="91440" bIns="45720" rtlCol="0" anchor="ctr"/>
+          <a:lstStyle>
+            <a:lvl1pPr algn="ctr">
+              <a:defRPr sz="1200">
+                <a:solidFill>
+                  <a:schemeClr val="tx1">
+                    <a:tint val="75000"/>
+                  </a:schemeClr>
+                </a:solidFill>
+              </a:defRPr>
+            </a:lvl1pPr>
+          </a:lstStyle>
+          <a:p>
+            <a:endParaRPr lang="fr-BE"/>
+          </a:p>
+        </p:txBody>
+      </p:sp>
+      <p:pic>
+        <p:nvPicPr>
+          <p:cNvPr id="7" name="Picture 7">
+            <a:extLst>
+              <a:ext uri="{FF2B5EF4-FFF2-40B4-BE49-F238E27FC236}">
+                <a16:creationId xmlns:a16="http://schemas.microsoft.com/office/drawing/2014/main" id="{50E6052E-060B-69BC-3593-329331AF189B}"/>
+              </a:ext>
+            </a:extLst>
+          </p:cNvPr>
+          <p:cNvPicPr>
+            <a:picLocks noChangeAspect="1"/>
+          </p:cNvPicPr>
           <p:nvPr userDrawn="1"/>
         </p:nvPicPr>
         <p:blipFill>
-          <a:blip r:embed="rId11">
+          <a:blip r:embed="rId12">
             <a:extLst>
               <a:ext uri="{28A0092B-C50C-407E-A947-70E740481C1C}">
                 <a14:useLocalDpi xmlns:a14="http://schemas.microsoft.com/office/drawing/2010/main"/>
@@ -3161,21 +4162,22 @@
     </p:spTree>
     <p:extLst>
       <p:ext uri="{BB962C8B-B14F-4D97-AF65-F5344CB8AC3E}">
-        <p14:creationId xmlns:p14="http://schemas.microsoft.com/office/powerpoint/2010/main" val="87028773"/>
+        <p14:creationId xmlns:p14="http://schemas.microsoft.com/office/powerpoint/2010/main" val="3421475044"/>
       </p:ext>
     </p:extLst>
   </p:cSld>
   <p:clrMap bg1="lt1" tx1="dk1" bg2="lt2" tx2="dk2" accent1="accent1" accent2="accent2" accent3="accent3" accent4="accent4" accent5="accent5" accent6="accent6" hlink="hlink" folHlink="folHlink"/>
   <p:sldLayoutIdLst>
-    <p:sldLayoutId id="2147483844" r:id="rId1"/>
-    <p:sldLayoutId id="2147483845" r:id="rId2"/>
-    <p:sldLayoutId id="2147483846" r:id="rId3"/>
-    <p:sldLayoutId id="2147483847" r:id="rId4"/>
-    <p:sldLayoutId id="2147483848" r:id="rId5"/>
-    <p:sldLayoutId id="2147483849" r:id="rId6"/>
-    <p:sldLayoutId id="2147483850" r:id="rId7"/>
-    <p:sldLayoutId id="2147483851" r:id="rId8"/>
-    <p:sldLayoutId id="2147483852" r:id="rId9"/>
+    <p:sldLayoutId id="2147483865" r:id="rId1"/>
+    <p:sldLayoutId id="2147483866" r:id="rId2"/>
+    <p:sldLayoutId id="2147483867" r:id="rId3"/>
+    <p:sldLayoutId id="2147483868" r:id="rId4"/>
+    <p:sldLayoutId id="2147483869" r:id="rId5"/>
+    <p:sldLayoutId id="2147483870" r:id="rId6"/>
+    <p:sldLayoutId id="2147483871" r:id="rId7"/>
+    <p:sldLayoutId id="2147483872" r:id="rId8"/>
+    <p:sldLayoutId id="2147483873" r:id="rId9"/>
+    <p:sldLayoutId id="2147483874" r:id="rId10"/>
   </p:sldLayoutIdLst>
   <mc:AlternateContent xmlns:mc="http://schemas.openxmlformats.org/markup-compatibility/2006" xmlns:p14="http://schemas.microsoft.com/office/powerpoint/2010/main">
     <mc:Choice Requires="p14">
@@ -3274,8 +4276,13 @@
         <a:spcBef>
           <a:spcPts val="1000"/>
         </a:spcBef>
-        <a:buFont typeface="Arial" panose="020B0604020202020204" pitchFamily="34" charset="0"/>
-        <a:buChar char="•"/>
+        <a:buClr>
+          <a:schemeClr val="bg1">
+            <a:lumMod val="50000"/>
+          </a:schemeClr>
+        </a:buClr>
+        <a:buFont typeface="Wingdings" panose="05000000000000000000" pitchFamily="2" charset="2"/>
+        <a:buChar char="§"/>
         <a:defRPr sz="3600" kern="1200">
           <a:solidFill>
             <a:schemeClr val="tx1"/>
@@ -3292,8 +4299,13 @@
         <a:spcBef>
           <a:spcPts val="500"/>
         </a:spcBef>
-        <a:buFont typeface="Arial" panose="020B0604020202020204" pitchFamily="34" charset="0"/>
-        <a:buChar char="•"/>
+        <a:buClr>
+          <a:schemeClr val="bg1">
+            <a:lumMod val="50000"/>
+          </a:schemeClr>
+        </a:buClr>
+        <a:buFont typeface="Wingdings" panose="05000000000000000000" pitchFamily="2" charset="2"/>
+        <a:buChar char="§"/>
         <a:defRPr sz="3200" kern="1200">
           <a:solidFill>
             <a:schemeClr val="tx1"/>
@@ -3310,8 +4322,13 @@
         <a:spcBef>
           <a:spcPts val="500"/>
         </a:spcBef>
-        <a:buFont typeface="Arial" panose="020B0604020202020204" pitchFamily="34" charset="0"/>
-        <a:buChar char="•"/>
+        <a:buClr>
+          <a:schemeClr val="bg1">
+            <a:lumMod val="50000"/>
+          </a:schemeClr>
+        </a:buClr>
+        <a:buFont typeface="Wingdings" panose="05000000000000000000" pitchFamily="2" charset="2"/>
+        <a:buChar char="§"/>
         <a:defRPr sz="2800" kern="1200">
           <a:solidFill>
             <a:schemeClr val="tx1"/>
@@ -3328,8 +4345,13 @@
         <a:spcBef>
           <a:spcPts val="500"/>
         </a:spcBef>
-        <a:buFont typeface="Arial" panose="020B0604020202020204" pitchFamily="34" charset="0"/>
-        <a:buChar char="•"/>
+        <a:buClr>
+          <a:schemeClr val="bg1">
+            <a:lumMod val="50000"/>
+          </a:schemeClr>
+        </a:buClr>
+        <a:buFont typeface="Wingdings" panose="05000000000000000000" pitchFamily="2" charset="2"/>
+        <a:buChar char="§"/>
         <a:defRPr sz="2400" kern="1200">
           <a:solidFill>
             <a:schemeClr val="tx1"/>
@@ -3346,8 +4368,13 @@
         <a:spcBef>
           <a:spcPts val="500"/>
         </a:spcBef>
-        <a:buFont typeface="Arial" panose="020B0604020202020204" pitchFamily="34" charset="0"/>
-        <a:buChar char="•"/>
+        <a:buClr>
+          <a:schemeClr val="bg1">
+            <a:lumMod val="50000"/>
+          </a:schemeClr>
+        </a:buClr>
+        <a:buFont typeface="Wingdings" panose="05000000000000000000" pitchFamily="2" charset="2"/>
+        <a:buChar char="§"/>
         <a:defRPr sz="2400" kern="1200">
           <a:solidFill>
             <a:schemeClr val="tx1"/>
@@ -3563,7 +4590,7 @@
           <a:p>
             <a:r>
               <a:rPr lang="fr-BE"/>
-              <a:t>Section 11 : </a:t>
+              <a:t>Partie 11 : </a:t>
             </a:r>
             <a:br>
               <a:rPr lang="fr-BE"/>
@@ -3989,12 +5016,7 @@
             <p:ph type="title"/>
           </p:nvPr>
         </p:nvSpPr>
-        <p:spPr>
-          <a:xfrm>
-            <a:off x="838200" y="365125"/>
-            <a:ext cx="10515600" cy="1325563"/>
-          </a:xfrm>
-        </p:spPr>
+        <p:spPr/>
         <p:txBody>
           <a:bodyPr anchor="ctr">
             <a:normAutofit/>
@@ -4018,12 +5040,7 @@
             <p:ph sz="half" idx="1"/>
           </p:nvPr>
         </p:nvSpPr>
-        <p:spPr>
-          <a:xfrm>
-            <a:off x="838200" y="1825625"/>
-            <a:ext cx="5181600" cy="4351339"/>
-          </a:xfrm>
-        </p:spPr>
+        <p:spPr/>
         <p:txBody>
           <a:bodyPr>
             <a:normAutofit/>
@@ -7758,10 +8775,10 @@
       </p:sp>
       <p:sp>
         <p:nvSpPr>
-          <p:cNvPr id="5" name="Espace réservé du texte 4">
+          <p:cNvPr id="2" name="Espace réservé du texte 1">
             <a:extLst>
               <a:ext uri="{FF2B5EF4-FFF2-40B4-BE49-F238E27FC236}">
-                <a16:creationId xmlns:a16="http://schemas.microsoft.com/office/drawing/2014/main" id="{DF6E62FD-075B-47BE-9FBC-DAF926A3EFFA}"/>
+                <a16:creationId xmlns:a16="http://schemas.microsoft.com/office/drawing/2014/main" id="{58ECC06A-B4E7-2E1B-691E-38550CFAE20F}"/>
               </a:ext>
             </a:extLst>
           </p:cNvPr>
@@ -7770,6 +8787,31 @@
           </p:cNvSpPr>
           <p:nvPr>
             <p:ph type="body" idx="1"/>
+          </p:nvPr>
+        </p:nvSpPr>
+        <p:spPr/>
+        <p:txBody>
+          <a:bodyPr/>
+          <a:lstStyle/>
+          <a:p>
+            <a:endParaRPr lang="fr-BE"/>
+          </a:p>
+        </p:txBody>
+      </p:sp>
+      <p:sp>
+        <p:nvSpPr>
+          <p:cNvPr id="3" name="Espace réservé pour une image  2">
+            <a:extLst>
+              <a:ext uri="{FF2B5EF4-FFF2-40B4-BE49-F238E27FC236}">
+                <a16:creationId xmlns:a16="http://schemas.microsoft.com/office/drawing/2014/main" id="{5F54080D-932D-3DCA-22C6-955A564C67BF}"/>
+              </a:ext>
+            </a:extLst>
+          </p:cNvPr>
+          <p:cNvSpPr>
+            <a:spLocks noGrp="1"/>
+          </p:cNvSpPr>
+          <p:nvPr>
+            <p:ph type="pic" sz="quarter" idx="10"/>
           </p:nvPr>
         </p:nvSpPr>
         <p:spPr/>
@@ -8155,12 +9197,7 @@
             <p:ph type="title"/>
           </p:nvPr>
         </p:nvSpPr>
-        <p:spPr>
-          <a:xfrm>
-            <a:off x="838200" y="365125"/>
-            <a:ext cx="10515600" cy="1325563"/>
-          </a:xfrm>
-        </p:spPr>
+        <p:spPr/>
         <p:txBody>
           <a:bodyPr/>
           <a:lstStyle/>
@@ -9380,10 +10417,10 @@
       </p:sp>
       <p:sp>
         <p:nvSpPr>
-          <p:cNvPr id="5" name="Espace réservé du texte 4">
+          <p:cNvPr id="10" name="Espace réservé du texte 9">
             <a:extLst>
               <a:ext uri="{FF2B5EF4-FFF2-40B4-BE49-F238E27FC236}">
-                <a16:creationId xmlns:a16="http://schemas.microsoft.com/office/drawing/2014/main" id="{DF6E62FD-075B-47BE-9FBC-DAF926A3EFFA}"/>
+                <a16:creationId xmlns:a16="http://schemas.microsoft.com/office/drawing/2014/main" id="{A15224A8-6FA1-4C86-3816-8ECE3BF52667}"/>
               </a:ext>
             </a:extLst>
           </p:cNvPr>
@@ -9392,6 +10429,31 @@
           </p:cNvSpPr>
           <p:nvPr>
             <p:ph type="body" idx="1"/>
+          </p:nvPr>
+        </p:nvSpPr>
+        <p:spPr/>
+        <p:txBody>
+          <a:bodyPr/>
+          <a:lstStyle/>
+          <a:p>
+            <a:endParaRPr lang="fr-BE"/>
+          </a:p>
+        </p:txBody>
+      </p:sp>
+      <p:sp>
+        <p:nvSpPr>
+          <p:cNvPr id="11" name="Espace réservé pour une image  10">
+            <a:extLst>
+              <a:ext uri="{FF2B5EF4-FFF2-40B4-BE49-F238E27FC236}">
+                <a16:creationId xmlns:a16="http://schemas.microsoft.com/office/drawing/2014/main" id="{80A9DC04-CEBF-575D-7A2B-056F99FEAD88}"/>
+              </a:ext>
+            </a:extLst>
+          </p:cNvPr>
+          <p:cNvSpPr>
+            <a:spLocks noGrp="1"/>
+          </p:cNvSpPr>
+          <p:nvPr>
+            <p:ph type="pic" sz="quarter" idx="10"/>
           </p:nvPr>
         </p:nvSpPr>
         <p:spPr/>
@@ -10322,6 +11384,45 @@
           </a:p>
         </p:txBody>
       </p:sp>
+      <p:pic>
+        <p:nvPicPr>
+          <p:cNvPr id="6" name="Espace réservé du contenu 5">
+            <a:extLst>
+              <a:ext uri="{FF2B5EF4-FFF2-40B4-BE49-F238E27FC236}">
+                <a16:creationId xmlns:a16="http://schemas.microsoft.com/office/drawing/2014/main" id="{CB27A2C6-D1FC-43C9-9CC3-D3935F4F546B}"/>
+              </a:ext>
+            </a:extLst>
+          </p:cNvPr>
+          <p:cNvPicPr>
+            <a:picLocks noGrp="1" noChangeAspect="1"/>
+          </p:cNvPicPr>
+          <p:nvPr>
+            <p:ph sz="half" idx="1"/>
+          </p:nvPr>
+        </p:nvPicPr>
+        <p:blipFill>
+          <a:blip r:embed="rId3">
+            <a:lum/>
+            <a:alphaModFix/>
+          </a:blip>
+          <a:stretch>
+            <a:fillRect/>
+          </a:stretch>
+        </p:blipFill>
+        <p:spPr>
+          <a:xfrm>
+            <a:off x="857250" y="2743200"/>
+            <a:ext cx="5143500" cy="2381250"/>
+          </a:xfrm>
+          <a:prstGeom prst="rect">
+            <a:avLst/>
+          </a:prstGeom>
+          <a:noFill/>
+          <a:ln>
+            <a:noFill/>
+          </a:ln>
+        </p:spPr>
+      </p:pic>
       <p:sp>
         <p:nvSpPr>
           <p:cNvPr id="5" name="Espace réservé du contenu 4">
@@ -10371,46 +11472,6 @@
           </a:p>
         </p:txBody>
       </p:sp>
-      <p:pic>
-        <p:nvPicPr>
-          <p:cNvPr id="6" name="Espace réservé du contenu 5">
-            <a:extLst>
-              <a:ext uri="{FF2B5EF4-FFF2-40B4-BE49-F238E27FC236}">
-                <a16:creationId xmlns:a16="http://schemas.microsoft.com/office/drawing/2014/main" id="{CB27A2C6-D1FC-43C9-9CC3-D3935F4F546B}"/>
-              </a:ext>
-            </a:extLst>
-          </p:cNvPr>
-          <p:cNvPicPr>
-            <a:picLocks noGrp="1" noChangeAspect="1"/>
-          </p:cNvPicPr>
-          <p:nvPr>
-            <p:ph sz="half" idx="1"/>
-          </p:nvPr>
-        </p:nvPicPr>
-        <p:blipFill>
-          <a:blip r:embed="rId3">
-            <a:lum/>
-            <a:alphaModFix/>
-          </a:blip>
-          <a:srcRect/>
-          <a:stretch>
-            <a:fillRect/>
-          </a:stretch>
-        </p:blipFill>
-        <p:spPr>
-          <a:xfrm>
-            <a:off x="857250" y="2743199"/>
-            <a:ext cx="6247340" cy="2892287"/>
-          </a:xfrm>
-          <a:prstGeom prst="rect">
-            <a:avLst/>
-          </a:prstGeom>
-          <a:noFill/>
-          <a:ln>
-            <a:noFill/>
-          </a:ln>
-        </p:spPr>
-      </p:pic>
     </p:spTree>
   </p:cSld>
   <p:clrMapOvr>
@@ -10563,88 +11624,6 @@
           </a:p>
         </p:txBody>
       </p:sp>
-      <p:sp>
-        <p:nvSpPr>
-          <p:cNvPr id="6" name="Espace réservé du contenu 5">
-            <a:extLst>
-              <a:ext uri="{FF2B5EF4-FFF2-40B4-BE49-F238E27FC236}">
-                <a16:creationId xmlns:a16="http://schemas.microsoft.com/office/drawing/2014/main" id="{B95E2F93-C71A-454B-A3A2-0285403DA1E0}"/>
-              </a:ext>
-            </a:extLst>
-          </p:cNvPr>
-          <p:cNvSpPr>
-            <a:spLocks noGrp="1"/>
-          </p:cNvSpPr>
-          <p:nvPr>
-            <p:ph sz="half" idx="2"/>
-          </p:nvPr>
-        </p:nvSpPr>
-        <p:spPr>
-          <a:xfrm>
-            <a:off x="4472609" y="1690689"/>
-            <a:ext cx="6881191" cy="4486276"/>
-          </a:xfrm>
-        </p:spPr>
-        <p:txBody>
-          <a:bodyPr>
-            <a:normAutofit fontScale="92500"/>
-          </a:bodyPr>
-          <a:lstStyle/>
-          <a:p>
-            <a:pPr lvl="0"/>
-            <a:r>
-              <a:rPr lang="fr-BE" sz="3600"/>
-              <a:t>Une classe se définit par :</a:t>
-            </a:r>
-          </a:p>
-          <a:p>
-            <a:pPr lvl="1"/>
-            <a:r>
-              <a:rPr lang="fr-BE"/>
-              <a:t>Un nom propre</a:t>
-            </a:r>
-          </a:p>
-          <a:p>
-            <a:pPr lvl="1"/>
-            <a:r>
-              <a:rPr lang="fr-BE"/>
-              <a:t>Des attributs</a:t>
-            </a:r>
-          </a:p>
-          <a:p>
-            <a:pPr lvl="1"/>
-            <a:r>
-              <a:rPr lang="fr-BE"/>
-              <a:t>Des méthodes agissant sur ces attributs</a:t>
-            </a:r>
-          </a:p>
-          <a:p>
-            <a:pPr lvl="0"/>
-            <a:r>
-              <a:rPr lang="fr-BE" sz="3600"/>
-              <a:t>Les objets, instances d'une même classe</a:t>
-            </a:r>
-          </a:p>
-          <a:p>
-            <a:pPr lvl="1"/>
-            <a:r>
-              <a:rPr lang="fr-BE"/>
-              <a:t>Partagent un même comportement</a:t>
-            </a:r>
-          </a:p>
-          <a:p>
-            <a:pPr lvl="1"/>
-            <a:r>
-              <a:rPr lang="fr-BE"/>
-              <a:t>Ne diffèrent entre eux que par la valeur des attributs.</a:t>
-            </a:r>
-            <a:endParaRPr lang="fr-BE" sz="3600"/>
-          </a:p>
-          <a:p>
-            <a:endParaRPr lang="fr-BE"/>
-          </a:p>
-        </p:txBody>
-      </p:sp>
       <p:pic>
         <p:nvPicPr>
           <p:cNvPr id="7" name="Espace réservé du contenu 6">
@@ -10685,6 +11664,88 @@
           </a:ln>
         </p:spPr>
       </p:pic>
+      <p:sp>
+        <p:nvSpPr>
+          <p:cNvPr id="6" name="Espace réservé du contenu 5">
+            <a:extLst>
+              <a:ext uri="{FF2B5EF4-FFF2-40B4-BE49-F238E27FC236}">
+                <a16:creationId xmlns:a16="http://schemas.microsoft.com/office/drawing/2014/main" id="{B95E2F93-C71A-454B-A3A2-0285403DA1E0}"/>
+              </a:ext>
+            </a:extLst>
+          </p:cNvPr>
+          <p:cNvSpPr>
+            <a:spLocks noGrp="1"/>
+          </p:cNvSpPr>
+          <p:nvPr>
+            <p:ph sz="half" idx="2"/>
+          </p:nvPr>
+        </p:nvSpPr>
+        <p:spPr>
+          <a:xfrm>
+            <a:off x="4472609" y="1690689"/>
+            <a:ext cx="6881191" cy="4486276"/>
+          </a:xfrm>
+        </p:spPr>
+        <p:txBody>
+          <a:bodyPr>
+            <a:normAutofit fontScale="92500"/>
+          </a:bodyPr>
+          <a:lstStyle/>
+          <a:p>
+            <a:pPr lvl="0"/>
+            <a:r>
+              <a:rPr lang="fr-BE" sz="3600"/>
+              <a:t>Une classe se définit par :</a:t>
+            </a:r>
+          </a:p>
+          <a:p>
+            <a:pPr lvl="1"/>
+            <a:r>
+              <a:rPr lang="fr-BE"/>
+              <a:t>Un nom propre</a:t>
+            </a:r>
+          </a:p>
+          <a:p>
+            <a:pPr lvl="1"/>
+            <a:r>
+              <a:rPr lang="fr-BE"/>
+              <a:t>Des attributs</a:t>
+            </a:r>
+          </a:p>
+          <a:p>
+            <a:pPr lvl="1"/>
+            <a:r>
+              <a:rPr lang="fr-BE"/>
+              <a:t>Des méthodes agissant sur ces attributs</a:t>
+            </a:r>
+          </a:p>
+          <a:p>
+            <a:pPr lvl="0"/>
+            <a:r>
+              <a:rPr lang="fr-BE" sz="3600"/>
+              <a:t>Les objets, instances d'une même classe</a:t>
+            </a:r>
+          </a:p>
+          <a:p>
+            <a:pPr lvl="1"/>
+            <a:r>
+              <a:rPr lang="fr-BE"/>
+              <a:t>Partagent un même comportement</a:t>
+            </a:r>
+          </a:p>
+          <a:p>
+            <a:pPr lvl="1"/>
+            <a:r>
+              <a:rPr lang="fr-BE"/>
+              <a:t>Ne diffèrent entre eux que par la valeur des attributs.</a:t>
+            </a:r>
+            <a:endParaRPr lang="fr-BE" sz="3600"/>
+          </a:p>
+          <a:p>
+            <a:endParaRPr lang="fr-BE"/>
+          </a:p>
+        </p:txBody>
+      </p:sp>
     </p:spTree>
   </p:cSld>
   <p:clrMapOvr>
@@ -11490,15 +12551,14 @@
               </a:ext>
             </a:extLst>
           </a:blip>
-          <a:srcRect/>
           <a:stretch>
             <a:fillRect/>
           </a:stretch>
         </p:blipFill>
         <p:spPr bwMode="auto">
           <a:xfrm>
-            <a:off x="6874316" y="2560320"/>
-            <a:ext cx="4340666" cy="2762242"/>
+            <a:off x="7715250" y="3267075"/>
+            <a:ext cx="2095500" cy="1333500"/>
           </a:xfrm>
           <a:prstGeom prst="rect">
             <a:avLst/>
@@ -12308,20 +13368,6 @@
               </a:rPr>
               <a:t>return …</a:t>
             </a:r>
-            <a:r>
-              <a:rPr kumimoji="0" lang="fr-FR" altLang="fr-FR" sz="1800" b="0" i="0" u="none" strike="noStrike" cap="none" normalizeH="0" baseline="0">
-                <a:ln>
-                  <a:noFill/>
-                </a:ln>
-                <a:solidFill>
-                  <a:srgbClr val="067D17"/>
-                </a:solidFill>
-                <a:effectLst/>
-                <a:latin typeface="Consolas" panose="020B0609020204030204" pitchFamily="49" charset="0"/>
-                <a:cs typeface="Courier New" panose="02070309020205020404" pitchFamily="49" charset="0"/>
-              </a:rPr>
-              <a:t/>
-            </a:r>
             <a:br>
               <a:rPr kumimoji="0" lang="fr-FR" altLang="fr-FR" sz="1800" b="0" i="0" u="none" strike="noStrike" cap="none" normalizeH="0" baseline="0">
                 <a:ln>
@@ -12335,20 +13381,6 @@
                 <a:cs typeface="Courier New" panose="02070309020205020404" pitchFamily="49" charset="0"/>
               </a:rPr>
             </a:br>
-            <a:r>
-              <a:rPr kumimoji="0" lang="fr-FR" altLang="fr-FR" sz="1800" b="0" i="0" u="none" strike="noStrike" cap="none" normalizeH="0" baseline="0">
-                <a:ln>
-                  <a:noFill/>
-                </a:ln>
-                <a:solidFill>
-                  <a:srgbClr val="067D17"/>
-                </a:solidFill>
-                <a:effectLst/>
-                <a:latin typeface="Consolas" panose="020B0609020204030204" pitchFamily="49" charset="0"/>
-                <a:cs typeface="Courier New" panose="02070309020205020404" pitchFamily="49" charset="0"/>
-              </a:rPr>
-              <a:t/>
-            </a:r>
             <a:br>
               <a:rPr kumimoji="0" lang="fr-FR" altLang="fr-FR" sz="1800" b="0" i="0" u="none" strike="noStrike" cap="none" normalizeH="0" baseline="0">
                 <a:ln>
@@ -12986,20 +14018,6 @@
                 <a:cs typeface="Courier New" panose="02070309020205020404" pitchFamily="49" charset="0"/>
               </a:rPr>
             </a:br>
-            <a:r>
-              <a:rPr kumimoji="0" lang="fr-FR" altLang="fr-FR" sz="1800" b="0" i="0" u="none" strike="noStrike" cap="none" normalizeH="0" baseline="0">
-                <a:ln>
-                  <a:noFill/>
-                </a:ln>
-                <a:solidFill>
-                  <a:srgbClr val="080808"/>
-                </a:solidFill>
-                <a:effectLst/>
-                <a:latin typeface="Consolas" panose="020B0609020204030204" pitchFamily="49" charset="0"/>
-                <a:cs typeface="Courier New" panose="02070309020205020404" pitchFamily="49" charset="0"/>
-              </a:rPr>
-              <a:t/>
-            </a:r>
             <a:br>
               <a:rPr kumimoji="0" lang="fr-FR" altLang="fr-FR" sz="1800" b="0" i="0" u="none" strike="noStrike" cap="none" normalizeH="0" baseline="0">
                 <a:ln>
@@ -13057,20 +14075,6 @@
               </a:rPr>
               <a:t>  # objet détruit </a:t>
             </a:r>
-            <a:r>
-              <a:rPr kumimoji="0" lang="fr-FR" altLang="fr-FR" sz="1800" b="0" i="0" u="none" strike="noStrike" cap="none" normalizeH="0" baseline="0">
-                <a:ln>
-                  <a:noFill/>
-                </a:ln>
-                <a:solidFill>
-                  <a:srgbClr val="0033B3"/>
-                </a:solidFill>
-                <a:effectLst/>
-                <a:latin typeface="Consolas" panose="020B0609020204030204" pitchFamily="49" charset="0"/>
-                <a:cs typeface="Courier New" panose="02070309020205020404" pitchFamily="49" charset="0"/>
-              </a:rPr>
-              <a:t/>
-            </a:r>
             <a:br>
               <a:rPr kumimoji="0" lang="fr-FR" altLang="fr-FR" sz="1800" b="0" i="0" u="none" strike="noStrike" cap="none" normalizeH="0" baseline="0">
                 <a:ln>
@@ -13113,20 +14117,6 @@
                 <a:cs typeface="Courier New" panose="02070309020205020404" pitchFamily="49" charset="0"/>
               </a:rPr>
               <a:t>None  # référence de l'objet détruit</a:t>
-            </a:r>
-            <a:r>
-              <a:rPr kumimoji="0" lang="fr-FR" altLang="fr-FR" sz="1800" b="0" i="0" u="none" strike="noStrike" cap="none" normalizeH="0" baseline="0">
-                <a:ln>
-                  <a:noFill/>
-                </a:ln>
-                <a:solidFill>
-                  <a:srgbClr val="0033B3"/>
-                </a:solidFill>
-                <a:effectLst/>
-                <a:latin typeface="Consolas" panose="020B0609020204030204" pitchFamily="49" charset="0"/>
-                <a:cs typeface="Courier New" panose="02070309020205020404" pitchFamily="49" charset="0"/>
-              </a:rPr>
-              <a:t/>
             </a:r>
             <a:br>
               <a:rPr kumimoji="0" lang="fr-FR" altLang="fr-FR" sz="1800" b="0" i="0" u="none" strike="noStrike" cap="none" normalizeH="0" baseline="0">
@@ -13294,7 +14284,7 @@
         <p:spPr/>
         <p:txBody>
           <a:bodyPr numCol="2">
-            <a:normAutofit fontScale="85000" lnSpcReduction="20000"/>
+            <a:normAutofit fontScale="92500" lnSpcReduction="20000"/>
           </a:bodyPr>
           <a:lstStyle/>
           <a:p>
@@ -13721,7 +14711,7 @@
         <p:spPr/>
         <p:txBody>
           <a:bodyPr numCol="2">
-            <a:normAutofit fontScale="92500" lnSpcReduction="20000"/>
+            <a:normAutofit fontScale="92500" lnSpcReduction="10000"/>
           </a:bodyPr>
           <a:lstStyle/>
           <a:p>
@@ -15002,14 +15992,13 @@
               </a:ext>
             </a:extLst>
           </a:blip>
-          <a:srcRect/>
           <a:stretch>
             <a:fillRect/>
           </a:stretch>
         </p:blipFill>
         <p:spPr>
           <a:xfrm>
-            <a:off x="6381750" y="2910681"/>
+            <a:off x="6381750" y="2843213"/>
             <a:ext cx="4762500" cy="2181225"/>
           </a:xfrm>
         </p:spPr>
@@ -15526,18 +16515,6 @@
               </a:rPr>
               <a:t>// 7</a:t>
             </a:r>
-            <a:r>
-              <a:rPr lang="fr-BE" sz="2400">
-                <a:solidFill>
-                  <a:schemeClr val="accent6">
-                    <a:lumMod val="50000"/>
-                  </a:schemeClr>
-                </a:solidFill>
-                <a:latin typeface="Courier New" panose="02070309020205020404" pitchFamily="49" charset="0"/>
-                <a:cs typeface="Courier New" panose="02070309020205020404" pitchFamily="49" charset="0"/>
-              </a:rPr>
-              <a:t/>
-            </a:r>
             <a:br>
               <a:rPr lang="fr-BE" sz="2400">
                 <a:solidFill>
@@ -15729,15 +16706,14 @@
               </a:ext>
             </a:extLst>
           </a:blip>
-          <a:srcRect/>
           <a:stretch>
             <a:fillRect/>
           </a:stretch>
         </p:blipFill>
         <p:spPr bwMode="auto">
           <a:xfrm>
-            <a:off x="6821048" y="2921294"/>
-            <a:ext cx="4875000" cy="2160000"/>
+            <a:off x="7215187" y="3248025"/>
+            <a:ext cx="3095625" cy="1371600"/>
           </a:xfrm>
           <a:prstGeom prst="rect">
             <a:avLst/>
@@ -17347,13 +18323,6 @@
       </p:transition>
     </mc:Fallback>
   </mc:AlternateContent>
-  <p:timing>
-    <p:tnLst>
-      <p:par>
-        <p:cTn id="1" dur="indefinite" restart="never" nodeType="tmRoot"/>
-      </p:par>
-    </p:tnLst>
-  </p:timing>
 </p:sld>
 </file>
 
@@ -17404,10 +18373,10 @@
       </p:sp>
       <p:sp>
         <p:nvSpPr>
-          <p:cNvPr id="5" name="Espace réservé du texte 4">
+          <p:cNvPr id="2" name="Espace réservé du contenu 1">
             <a:extLst>
               <a:ext uri="{FF2B5EF4-FFF2-40B4-BE49-F238E27FC236}">
-                <a16:creationId xmlns:a16="http://schemas.microsoft.com/office/drawing/2014/main" id="{DF6E62FD-075B-47BE-9FBC-DAF926A3EFFA}"/>
+                <a16:creationId xmlns:a16="http://schemas.microsoft.com/office/drawing/2014/main" id="{1BDBA3AA-038B-0BAC-3E60-CC9C3F58CAD0}"/>
               </a:ext>
             </a:extLst>
           </p:cNvPr>
@@ -17415,7 +18384,7 @@
             <a:spLocks noGrp="1"/>
           </p:cNvSpPr>
           <p:nvPr>
-            <p:ph type="body" idx="1"/>
+            <p:ph idx="1"/>
           </p:nvPr>
         </p:nvSpPr>
         <p:spPr/>
@@ -17449,13 +18418,6 @@
       </p:transition>
     </mc:Fallback>
   </mc:AlternateContent>
-  <p:timing>
-    <p:tnLst>
-      <p:par>
-        <p:cTn id="1" dur="indefinite" restart="never" nodeType="tmRoot"/>
-      </p:par>
-    </p:tnLst>
-  </p:timing>
 </p:sld>
 </file>
 
@@ -17535,13 +18497,6 @@
       </p:transition>
     </mc:Fallback>
   </mc:AlternateContent>
-  <p:timing>
-    <p:tnLst>
-      <p:par>
-        <p:cTn id="1" dur="indefinite" restart="never" nodeType="tmRoot"/>
-      </p:par>
-    </p:tnLst>
-  </p:timing>
 </p:sld>
 </file>
 
@@ -17621,13 +18576,6 @@
       </p:transition>
     </mc:Fallback>
   </mc:AlternateContent>
-  <p:timing>
-    <p:tnLst>
-      <p:par>
-        <p:cTn id="1" dur="indefinite" restart="never" nodeType="tmRoot"/>
-      </p:par>
-    </p:tnLst>
-  </p:timing>
 </p:sld>
 </file>
 
@@ -17707,13 +18655,6 @@
       </p:transition>
     </mc:Fallback>
   </mc:AlternateContent>
-  <p:timing>
-    <p:tnLst>
-      <p:par>
-        <p:cTn id="1" dur="indefinite" restart="never" nodeType="tmRoot"/>
-      </p:par>
-    </p:tnLst>
-  </p:timing>
 </p:sld>
 </file>
 
@@ -17793,13 +18734,6 @@
       </p:transition>
     </mc:Fallback>
   </mc:AlternateContent>
-  <p:timing>
-    <p:tnLst>
-      <p:par>
-        <p:cTn id="1" dur="indefinite" restart="never" nodeType="tmRoot"/>
-      </p:par>
-    </p:tnLst>
-  </p:timing>
 </p:sld>
 </file>
 
@@ -17958,13 +18892,6 @@
       </p:transition>
     </mc:Fallback>
   </mc:AlternateContent>
-  <p:timing>
-    <p:tnLst>
-      <p:par>
-        <p:cTn id="1" dur="indefinite" restart="never" nodeType="tmRoot"/>
-      </p:par>
-    </p:tnLst>
-  </p:timing>
 </p:sld>
 </file>
 
@@ -18044,13 +18971,6 @@
       </p:transition>
     </mc:Fallback>
   </mc:AlternateContent>
-  <p:timing>
-    <p:tnLst>
-      <p:par>
-        <p:cTn id="1" dur="indefinite" restart="never" nodeType="tmRoot"/>
-      </p:par>
-    </p:tnLst>
-  </p:timing>
 </p:sld>
 </file>
 
@@ -18130,13 +19050,6 @@
       </p:transition>
     </mc:Fallback>
   </mc:AlternateContent>
-  <p:timing>
-    <p:tnLst>
-      <p:par>
-        <p:cTn id="1" dur="indefinite" restart="never" nodeType="tmRoot"/>
-      </p:par>
-    </p:tnLst>
-  </p:timing>
 </p:sld>
 </file>
 
@@ -18173,12 +19086,7 @@
             <p:ph type="title"/>
           </p:nvPr>
         </p:nvSpPr>
-        <p:spPr>
-          <a:xfrm>
-            <a:off x="838200" y="365125"/>
-            <a:ext cx="10515600" cy="1325563"/>
-          </a:xfrm>
-        </p:spPr>
+        <p:spPr/>
         <p:txBody>
           <a:bodyPr/>
           <a:lstStyle/>
@@ -18203,7 +19111,7 @@
             <a:spLocks noGrp="1"/>
           </p:cNvSpPr>
           <p:nvPr>
-            <p:ph sz="half" idx="2"/>
+            <p:ph sz="half" idx="1"/>
           </p:nvPr>
         </p:nvSpPr>
         <p:spPr>
@@ -19033,13 +19941,6 @@
       </p:transition>
     </mc:Fallback>
   </mc:AlternateContent>
-  <p:timing>
-    <p:tnLst>
-      <p:par>
-        <p:cTn id="1" dur="indefinite" restart="never" nodeType="tmRoot"/>
-      </p:par>
-    </p:tnLst>
-  </p:timing>
 </p:sld>
 </file>
 
@@ -19076,12 +19977,7 @@
             <p:ph type="title"/>
           </p:nvPr>
         </p:nvSpPr>
-        <p:spPr>
-          <a:xfrm>
-            <a:off x="838200" y="365125"/>
-            <a:ext cx="10515600" cy="1325563"/>
-          </a:xfrm>
-        </p:spPr>
+        <p:spPr/>
         <p:txBody>
           <a:bodyPr/>
           <a:lstStyle/>
@@ -19106,7 +20002,7 @@
             <a:spLocks noGrp="1"/>
           </p:cNvSpPr>
           <p:nvPr>
-            <p:ph sz="half" idx="2"/>
+            <p:ph sz="half" idx="1"/>
           </p:nvPr>
         </p:nvSpPr>
         <p:spPr/>
@@ -19771,13 +20667,6 @@
       </p:transition>
     </mc:Fallback>
   </mc:AlternateContent>
-  <p:timing>
-    <p:tnLst>
-      <p:par>
-        <p:cTn id="1" dur="indefinite" restart="never" nodeType="tmRoot"/>
-      </p:par>
-    </p:tnLst>
-  </p:timing>
 </p:sld>
 </file>
 
@@ -20044,18 +20933,6 @@
                 <a:cs typeface="Courier New" panose="02070309020205020404" pitchFamily="49" charset="0"/>
               </a:rPr>
             </a:br>
-            <a:r>
-              <a:rPr lang="fr-BE" sz="1800" b="1">
-                <a:solidFill>
-                  <a:schemeClr val="accent6">
-                    <a:lumMod val="50000"/>
-                  </a:schemeClr>
-                </a:solidFill>
-                <a:latin typeface="Courier New" panose="02070309020205020404" pitchFamily="49" charset="0"/>
-                <a:cs typeface="Courier New" panose="02070309020205020404" pitchFamily="49" charset="0"/>
-              </a:rPr>
-              <a:t/>
-            </a:r>
             <a:br>
               <a:rPr lang="fr-BE" sz="1800" b="1">
                 <a:solidFill>
@@ -20503,18 +21380,6 @@
               </a:rPr>
               <a:t>property</a:t>
             </a:r>
-            <a:r>
-              <a:rPr lang="en-US" sz="1800" b="1" dirty="0">
-                <a:solidFill>
-                  <a:schemeClr val="accent6">
-                    <a:lumMod val="50000"/>
-                  </a:schemeClr>
-                </a:solidFill>
-                <a:latin typeface="Courier New" panose="02070309020205020404" pitchFamily="49" charset="0"/>
-                <a:cs typeface="Courier New" panose="02070309020205020404" pitchFamily="49" charset="0"/>
-              </a:rPr>
-              <a:t/>
-            </a:r>
             <a:br>
               <a:rPr lang="en-US" sz="1800" b="1" dirty="0">
                 <a:solidFill>
@@ -20654,18 +21519,6 @@
               </a:rPr>
               <a:t>value_celsius</a:t>
             </a:r>
-            <a:r>
-              <a:rPr lang="fr-BE" sz="1800" b="1" dirty="0">
-                <a:solidFill>
-                  <a:schemeClr val="accent6">
-                    <a:lumMod val="50000"/>
-                  </a:schemeClr>
-                </a:solidFill>
-                <a:latin typeface="Courier New" panose="02070309020205020404" pitchFamily="49" charset="0"/>
-                <a:cs typeface="Courier New" panose="02070309020205020404" pitchFamily="49" charset="0"/>
-              </a:rPr>
-              <a:t/>
-            </a:r>
             <a:br>
               <a:rPr lang="fr-BE" sz="1800" b="1" dirty="0">
                 <a:solidFill>
@@ -20677,18 +21530,6 @@
                 <a:cs typeface="Courier New" panose="02070309020205020404" pitchFamily="49" charset="0"/>
               </a:rPr>
             </a:br>
-            <a:r>
-              <a:rPr lang="fr-BE" sz="1800" b="1" dirty="0">
-                <a:solidFill>
-                  <a:schemeClr val="accent6">
-                    <a:lumMod val="50000"/>
-                  </a:schemeClr>
-                </a:solidFill>
-                <a:latin typeface="Courier New" panose="02070309020205020404" pitchFamily="49" charset="0"/>
-                <a:cs typeface="Courier New" panose="02070309020205020404" pitchFamily="49" charset="0"/>
-              </a:rPr>
-              <a:t/>
-            </a:r>
             <a:br>
               <a:rPr lang="fr-BE" sz="1800" b="1" dirty="0">
                 <a:solidFill>
@@ -20719,18 +21560,6 @@
                 <a:cs typeface="Courier New" panose="02070309020205020404" pitchFamily="49" charset="0"/>
               </a:rPr>
               <a:t>value_celsius.setter</a:t>
-            </a:r>
-            <a:r>
-              <a:rPr lang="en-US" sz="1800" b="1" dirty="0">
-                <a:solidFill>
-                  <a:schemeClr val="accent6">
-                    <a:lumMod val="50000"/>
-                  </a:schemeClr>
-                </a:solidFill>
-                <a:latin typeface="Courier New" panose="02070309020205020404" pitchFamily="49" charset="0"/>
-                <a:cs typeface="Courier New" panose="02070309020205020404" pitchFamily="49" charset="0"/>
-              </a:rPr>
-              <a:t/>
             </a:r>
             <a:br>
               <a:rPr lang="en-US" sz="1800" b="1" dirty="0">
@@ -21184,7 +22013,7 @@
                 <a:hlinkClick r:id="rId2">
                   <a:extLst>
                     <a:ext uri="{A12FA001-AC4F-418D-AE19-62706E023703}">
-                      <ahyp:hlinkClr xmlns:ahyp="http://schemas.microsoft.com/office/drawing/2018/hyperlinkcolor" xmlns="" val="tx"/>
+                      <ahyp:hlinkClr xmlns:ahyp="http://schemas.microsoft.com/office/drawing/2018/hyperlinkcolor" val="tx"/>
                     </a:ext>
                   </a:extLst>
                 </a:hlinkClick>
@@ -21199,7 +22028,7 @@
                 <a:hlinkClick r:id="rId2">
                   <a:extLst>
                     <a:ext uri="{A12FA001-AC4F-418D-AE19-62706E023703}">
-                      <ahyp:hlinkClr xmlns:ahyp="http://schemas.microsoft.com/office/drawing/2018/hyperlinkcolor" xmlns="" val="tx"/>
+                      <ahyp:hlinkClr xmlns:ahyp="http://schemas.microsoft.com/office/drawing/2018/hyperlinkcolor" val="tx"/>
                     </a:ext>
                   </a:extLst>
                 </a:hlinkClick>
@@ -21236,13 +22065,6 @@
       </p:transition>
     </mc:Fallback>
   </mc:AlternateContent>
-  <p:timing>
-    <p:tnLst>
-      <p:par>
-        <p:cTn id="1" dur="indefinite" restart="never" nodeType="tmRoot"/>
-      </p:par>
-    </p:tnLst>
-  </p:timing>
 </p:sld>
 </file>
 
@@ -21678,13 +22500,6 @@
       </p:transition>
     </mc:Fallback>
   </mc:AlternateContent>
-  <p:timing>
-    <p:tnLst>
-      <p:par>
-        <p:cTn id="1" dur="indefinite" restart="never" nodeType="tmRoot"/>
-      </p:par>
-    </p:tnLst>
-  </p:timing>
 </p:sld>
 </file>
 
@@ -22504,13 +23319,6 @@
       </p:transition>
     </mc:Fallback>
   </mc:AlternateContent>
-  <p:timing>
-    <p:tnLst>
-      <p:par>
-        <p:cTn id="1" dur="indefinite" restart="never" nodeType="tmRoot"/>
-      </p:par>
-    </p:tnLst>
-  </p:timing>
 </p:sld>
 </file>
 
@@ -22730,13 +23538,6 @@
       </p:transition>
     </mc:Fallback>
   </mc:AlternateContent>
-  <p:timing>
-    <p:tnLst>
-      <p:par>
-        <p:cTn id="1" dur="indefinite" restart="never" nodeType="tmRoot"/>
-      </p:par>
-    </p:tnLst>
-  </p:timing>
 </p:sld>
 </file>
 
@@ -23045,18 +23846,6 @@
               </a:rPr>
               <a:t>(stock)</a:t>
             </a:r>
-            <a:r>
-              <a:rPr lang="fr-BE" sz="2400" b="1" dirty="0">
-                <a:solidFill>
-                  <a:schemeClr val="bg1">
-                    <a:lumMod val="50000"/>
-                  </a:schemeClr>
-                </a:solidFill>
-                <a:latin typeface="Courier New" panose="02070309020205020404" pitchFamily="49" charset="0"/>
-                <a:cs typeface="Courier New" panose="02070309020205020404" pitchFamily="49" charset="0"/>
-              </a:rPr>
-              <a:t/>
-            </a:r>
             <a:br>
               <a:rPr lang="fr-BE" sz="2400" b="1" dirty="0">
                 <a:solidFill>
@@ -23138,18 +23927,6 @@
                 <a:cs typeface="Courier New" panose="02070309020205020404" pitchFamily="49" charset="0"/>
               </a:rPr>
               <a:t>(stock)</a:t>
-            </a:r>
-            <a:r>
-              <a:rPr lang="fr-BE" sz="2400" b="1" dirty="0">
-                <a:solidFill>
-                  <a:schemeClr val="bg1">
-                    <a:lumMod val="50000"/>
-                  </a:schemeClr>
-                </a:solidFill>
-                <a:latin typeface="Courier New" panose="02070309020205020404" pitchFamily="49" charset="0"/>
-                <a:cs typeface="Courier New" panose="02070309020205020404" pitchFamily="49" charset="0"/>
-              </a:rPr>
-              <a:t/>
             </a:r>
             <a:br>
               <a:rPr lang="fr-BE" sz="2400" b="1" dirty="0">
@@ -23314,13 +24091,6 @@
       </p:transition>
     </mc:Fallback>
   </mc:AlternateContent>
-  <p:timing>
-    <p:tnLst>
-      <p:par>
-        <p:cTn id="1" dur="indefinite" restart="never" nodeType="tmRoot"/>
-      </p:par>
-    </p:tnLst>
-  </p:timing>
 </p:sld>
 </file>
 
@@ -23455,7 +24225,7 @@
         <p:spPr/>
         <p:txBody>
           <a:bodyPr numCol="2">
-            <a:normAutofit fontScale="77500" lnSpcReduction="20000"/>
+            <a:normAutofit fontScale="85000" lnSpcReduction="20000"/>
           </a:bodyPr>
           <a:lstStyle/>
           <a:p>
@@ -23685,13 +24455,6 @@
       </p:transition>
     </mc:Fallback>
   </mc:AlternateContent>
-  <p:timing>
-    <p:tnLst>
-      <p:par>
-        <p:cTn id="1" dur="indefinite" restart="never" nodeType="tmRoot"/>
-      </p:par>
-    </p:tnLst>
-  </p:timing>
 </p:sld>
 </file>
 
@@ -23813,7 +24576,7 @@
               <a:t>méthode </a:t>
             </a:r>
             <a:r>
-              <a:rPr lang="fr-BE" b="1" dirty="0" smtClean="0">
+              <a:rPr lang="fr-BE" b="1" dirty="0">
                 <a:solidFill>
                   <a:schemeClr val="accent6">
                     <a:lumMod val="50000"/>
@@ -23825,7 +24588,7 @@
               <a:t>__</a:t>
             </a:r>
             <a:r>
-              <a:rPr lang="fr-BE" b="1" dirty="0" err="1" smtClean="0">
+              <a:rPr lang="fr-BE" b="1" dirty="0" err="1">
                 <a:solidFill>
                   <a:schemeClr val="accent6">
                     <a:lumMod val="50000"/>
@@ -23837,7 +24600,7 @@
               <a:t>str</a:t>
             </a:r>
             <a:r>
-              <a:rPr lang="fr-BE" b="1" dirty="0" smtClean="0">
+              <a:rPr lang="fr-BE" b="1" dirty="0">
                 <a:solidFill>
                   <a:schemeClr val="accent6">
                     <a:lumMod val="50000"/>
@@ -23848,15 +24611,6 @@
               </a:rPr>
               <a:t>__()</a:t>
             </a:r>
-            <a:endParaRPr lang="fr-BE" b="1" dirty="0">
-              <a:solidFill>
-                <a:schemeClr val="accent6">
-                  <a:lumMod val="50000"/>
-                </a:schemeClr>
-              </a:solidFill>
-              <a:latin typeface="Courier New" panose="02070309020205020404" pitchFamily="49" charset="0"/>
-              <a:cs typeface="Courier New" panose="02070309020205020404" pitchFamily="49" charset="0"/>
-            </a:endParaRPr>
           </a:p>
           <a:p>
             <a:pPr lvl="1"/>
@@ -23869,24 +24623,20 @@
             <a:pPr lvl="1"/>
             <a:r>
               <a:rPr lang="fr-BE" dirty="0"/>
-              <a:t>noms des mois définis comme attribut de classe à l’aide d’une </a:t>
-            </a:r>
-            <a:r>
-              <a:rPr lang="fr-BE" dirty="0" smtClean="0"/>
-              <a:t>liste</a:t>
-            </a:r>
-          </a:p>
-          <a:p>
-            <a:r>
-              <a:rPr lang="fr-FR" dirty="0" smtClean="0"/>
+              <a:t>noms des mois définis comme attribut de classe à l’aide d’une liste</a:t>
+            </a:r>
+          </a:p>
+          <a:p>
+            <a:r>
+              <a:rPr lang="fr-FR" dirty="0"/>
               <a:t>Méthode __</a:t>
             </a:r>
             <a:r>
-              <a:rPr lang="fr-FR" dirty="0" err="1" smtClean="0"/>
+              <a:rPr lang="fr-FR" dirty="0" err="1"/>
               <a:t>repr</a:t>
             </a:r>
             <a:r>
-              <a:rPr lang="fr-FR" dirty="0" smtClean="0"/>
+              <a:rPr lang="fr-FR" dirty="0"/>
               <a:t>__()</a:t>
             </a:r>
           </a:p>
@@ -23894,13 +24644,8 @@
             <a:pPr lvl="1"/>
             <a:r>
               <a:rPr lang="fr-BE" dirty="0"/>
-              <a:t>afficher la date sous la forme </a:t>
-            </a:r>
-            <a:r>
-              <a:rPr lang="fr-BE" dirty="0" smtClean="0"/>
-              <a:t>"20230125"</a:t>
-            </a:r>
-            <a:endParaRPr lang="fr-BE" dirty="0"/>
+              <a:t>afficher la date sous la forme "20230125"</a:t>
+            </a:r>
           </a:p>
           <a:p>
             <a:r>
@@ -24070,13 +24815,6 @@
       </p:transition>
     </mc:Fallback>
   </mc:AlternateContent>
-  <p:timing>
-    <p:tnLst>
-      <p:par>
-        <p:cTn id="1" dur="indefinite" restart="never" nodeType="tmRoot"/>
-      </p:par>
-    </p:tnLst>
-  </p:timing>
 </p:sld>
 </file>
 
@@ -24300,13 +25038,6 @@
       </p:transition>
     </mc:Fallback>
   </mc:AlternateContent>
-  <p:timing>
-    <p:tnLst>
-      <p:par>
-        <p:cTn id="1" dur="indefinite" restart="never" nodeType="tmRoot"/>
-      </p:par>
-    </p:tnLst>
-  </p:timing>
 </p:sld>
 </file>
 
@@ -24496,13 +25227,6 @@
       </p:transition>
     </mc:Fallback>
   </mc:AlternateContent>
-  <p:timing>
-    <p:tnLst>
-      <p:par>
-        <p:cTn id="1" dur="indefinite" restart="never" nodeType="tmRoot"/>
-      </p:par>
-    </p:tnLst>
-  </p:timing>
 </p:sld>
 </file>
 
@@ -24737,13 +25461,6 @@
       </p:transition>
     </mc:Fallback>
   </mc:AlternateContent>
-  <p:timing>
-    <p:tnLst>
-      <p:par>
-        <p:cTn id="1" dur="indefinite" restart="never" nodeType="tmRoot"/>
-      </p:par>
-    </p:tnLst>
-  </p:timing>
 </p:sld>
 </file>
 
@@ -24794,10 +25511,10 @@
       </p:sp>
       <p:sp>
         <p:nvSpPr>
-          <p:cNvPr id="5" name="Espace réservé du texte 4">
+          <p:cNvPr id="3" name="Espace réservé du texte 2">
             <a:extLst>
               <a:ext uri="{FF2B5EF4-FFF2-40B4-BE49-F238E27FC236}">
-                <a16:creationId xmlns:a16="http://schemas.microsoft.com/office/drawing/2014/main" id="{DF6E62FD-075B-47BE-9FBC-DAF926A3EFFA}"/>
+                <a16:creationId xmlns:a16="http://schemas.microsoft.com/office/drawing/2014/main" id="{CF33A2B1-95DE-7978-7C45-DD0C12313F9F}"/>
               </a:ext>
             </a:extLst>
           </p:cNvPr>
@@ -24806,6 +25523,31 @@
           </p:cNvSpPr>
           <p:nvPr>
             <p:ph type="body" idx="1"/>
+          </p:nvPr>
+        </p:nvSpPr>
+        <p:spPr/>
+        <p:txBody>
+          <a:bodyPr/>
+          <a:lstStyle/>
+          <a:p>
+            <a:endParaRPr lang="fr-BE"/>
+          </a:p>
+        </p:txBody>
+      </p:sp>
+      <p:sp>
+        <p:nvSpPr>
+          <p:cNvPr id="6" name="Espace réservé pour une image  5">
+            <a:extLst>
+              <a:ext uri="{FF2B5EF4-FFF2-40B4-BE49-F238E27FC236}">
+                <a16:creationId xmlns:a16="http://schemas.microsoft.com/office/drawing/2014/main" id="{2247F002-6CB8-1B6D-C2D0-0497172359FE}"/>
+              </a:ext>
+            </a:extLst>
+          </p:cNvPr>
+          <p:cNvSpPr>
+            <a:spLocks noGrp="1"/>
+          </p:cNvSpPr>
+          <p:nvPr>
+            <p:ph type="pic" sz="quarter" idx="10"/>
           </p:nvPr>
         </p:nvSpPr>
         <p:spPr/>
@@ -24839,13 +25581,6 @@
       </p:transition>
     </mc:Fallback>
   </mc:AlternateContent>
-  <p:timing>
-    <p:tnLst>
-      <p:par>
-        <p:cTn id="1" dur="indefinite" restart="never" nodeType="tmRoot"/>
-      </p:par>
-    </p:tnLst>
-  </p:timing>
 </p:sld>
 </file>
 
@@ -24925,13 +25660,6 @@
       </p:transition>
     </mc:Fallback>
   </mc:AlternateContent>
-  <p:timing>
-    <p:tnLst>
-      <p:par>
-        <p:cTn id="1" dur="indefinite" restart="never" nodeType="tmRoot"/>
-      </p:par>
-    </p:tnLst>
-  </p:timing>
 </p:sld>
 </file>
 
@@ -25011,13 +25739,6 @@
       </p:transition>
     </mc:Fallback>
   </mc:AlternateContent>
-  <p:timing>
-    <p:tnLst>
-      <p:par>
-        <p:cTn id="1" dur="indefinite" restart="never" nodeType="tmRoot"/>
-      </p:par>
-    </p:tnLst>
-  </p:timing>
 </p:sld>
 </file>
 
@@ -25097,13 +25818,6 @@
       </p:transition>
     </mc:Fallback>
   </mc:AlternateContent>
-  <p:timing>
-    <p:tnLst>
-      <p:par>
-        <p:cTn id="1" dur="indefinite" restart="never" nodeType="tmRoot"/>
-      </p:par>
-    </p:tnLst>
-  </p:timing>
 </p:sld>
 </file>
 
@@ -26918,7 +27632,7 @@
     </a:clrScheme>
     <a:fontScheme name="Garamond">
       <a:majorFont>
-        <a:latin typeface="Garamond"/>
+        <a:latin typeface="Garamond" panose="02020404030301010803"/>
         <a:ea typeface=""/>
         <a:cs typeface=""/>
         <a:font script="Jpan" typeface="ＭＳ Ｐゴシック"/>
@@ -26953,7 +27667,7 @@
         <a:font script="Geor" typeface="Sylfaen"/>
       </a:majorFont>
       <a:minorFont>
-        <a:latin typeface="Garamond"/>
+        <a:latin typeface="Garamond" panose="02020404030301010803"/>
         <a:ea typeface=""/>
         <a:cs typeface=""/>
         <a:font script="Jpan" typeface="ＭＳ Ｐゴシック"/>
@@ -26988,7 +27702,7 @@
         <a:font script="Geor" typeface="Sylfaen"/>
       </a:minorFont>
     </a:fontScheme>
-    <a:fmtScheme name="Subtle Solids">
+    <a:fmtScheme name="Solides discrets">
       <a:fillStyleLst>
         <a:solidFill>
           <a:schemeClr val="phClr"/>
@@ -27074,27 +27788,11 @@
       </a:bgFillStyleLst>
     </a:fmtScheme>
   </a:themeElements>
-  <a:objectDefaults>
-    <a:lnDef>
-      <a:spPr>
-        <a:noFill/>
-        <a:ln w="0">
-          <a:solidFill>
-            <a:srgbClr val="000000"/>
-          </a:solidFill>
-          <a:prstDash val="solid"/>
-          <a:headEnd type="none" w="med" len="med"/>
-          <a:tailEnd type="none" w="med" len="med"/>
-        </a:ln>
-      </a:spPr>
-      <a:bodyPr/>
-      <a:lstStyle/>
-    </a:lnDef>
-  </a:objectDefaults>
+  <a:objectDefaults/>
   <a:extraClrSchemeLst/>
   <a:extLst>
     <a:ext uri="{05A4C25C-085E-4340-85A3-A5531E510DB2}">
-      <thm15:themeFamily xmlns:thm15="http://schemas.microsoft.com/office/thememl/2012/main" name="burotix.potx" id="{9C0BE5DC-C6C9-4071-9A4C-65118980660F}" vid="{FB8F9C29-9002-457F-AC58-C4F14D7B64CB}"/>
+      <thm15:themeFamily xmlns:thm15="http://schemas.microsoft.com/office/thememl/2012/main" name="burotix2022.potm" id="{7A707283-01BA-4932-B574-4A389620091B}" vid="{093B5C4F-DD58-40B6-A0EE-0D8451AE628D}"/>
     </a:ext>
   </a:extLst>
 </a:theme>

</xml_diff>